<commit_message>
Updated poster and presentation
</commit_message>
<xml_diff>
--- a/FMCAD Poster.pptx
+++ b/FMCAD Poster.pptx
@@ -115,9 +115,9 @@
 <file path=ppt/revisionInfo.xml><?xml version="1.0" encoding="utf-8"?>
 <p1510:revInfo xmlns:a="http://schemas.openxmlformats.org/drawingml/2006/main" xmlns:r="http://schemas.openxmlformats.org/officeDocument/2006/relationships" xmlns:p1510="http://schemas.microsoft.com/office/powerpoint/2015/10/main">
   <p1510:revLst>
+    <p1510:client id="{FD8E1D27-11F9-1F91-3558-DE17A3379917}" v="55" dt="2019-09-28T02:48:01.550"/>
+    <p1510:client id="{869EC253-3183-9D03-DEF4-48C017D3C47D}" v="51" dt="2019-09-27T23:52:25.014"/>
     <p1510:client id="{4FB6AA68-809D-F51E-F4CE-AD11CF5F0493}" v="609" dt="2019-09-28T00:46:43.085"/>
-    <p1510:client id="{869EC253-3183-9D03-DEF4-48C017D3C47D}" v="51" dt="2019-09-27T23:52:25.014"/>
-    <p1510:client id="{FD8E1D27-11F9-1F91-3558-DE17A3379917}" v="55" dt="2019-09-28T02:48:01.550"/>
     <p1510:client id="{B0A645ED-900C-C548-20FF-3E18CB47768F}" v="91" dt="2019-09-28T01:00:44.013"/>
   </p1510:revLst>
 </p1510:revInfo>
@@ -546,7 +546,7 @@
           <a:p>
             <a:fld id="{846CE7D5-CF57-46EF-B807-FDD0502418D4}" type="datetimeFigureOut">
               <a:rPr lang="en-US" smtClean="0"/>
-              <a:t>10/3/2019</a:t>
+              <a:t>10/8/2019</a:t>
             </a:fld>
             <a:endParaRPr lang="en-US"/>
           </a:p>
@@ -716,7 +716,7 @@
           <a:p>
             <a:fld id="{846CE7D5-CF57-46EF-B807-FDD0502418D4}" type="datetimeFigureOut">
               <a:rPr lang="en-US" smtClean="0"/>
-              <a:t>10/3/2019</a:t>
+              <a:t>10/8/2019</a:t>
             </a:fld>
             <a:endParaRPr lang="en-US"/>
           </a:p>
@@ -896,7 +896,7 @@
           <a:p>
             <a:fld id="{846CE7D5-CF57-46EF-B807-FDD0502418D4}" type="datetimeFigureOut">
               <a:rPr lang="en-US" smtClean="0"/>
-              <a:t>10/3/2019</a:t>
+              <a:t>10/8/2019</a:t>
             </a:fld>
             <a:endParaRPr lang="en-US"/>
           </a:p>
@@ -1066,7 +1066,7 @@
           <a:p>
             <a:fld id="{846CE7D5-CF57-46EF-B807-FDD0502418D4}" type="datetimeFigureOut">
               <a:rPr lang="en-US" smtClean="0"/>
-              <a:t>10/3/2019</a:t>
+              <a:t>10/8/2019</a:t>
             </a:fld>
             <a:endParaRPr lang="en-US"/>
           </a:p>
@@ -1310,7 +1310,7 @@
           <a:p>
             <a:fld id="{846CE7D5-CF57-46EF-B807-FDD0502418D4}" type="datetimeFigureOut">
               <a:rPr lang="en-US" smtClean="0"/>
-              <a:t>10/3/2019</a:t>
+              <a:t>10/8/2019</a:t>
             </a:fld>
             <a:endParaRPr lang="en-US"/>
           </a:p>
@@ -1542,7 +1542,7 @@
           <a:p>
             <a:fld id="{846CE7D5-CF57-46EF-B807-FDD0502418D4}" type="datetimeFigureOut">
               <a:rPr lang="en-US" smtClean="0"/>
-              <a:t>10/3/2019</a:t>
+              <a:t>10/8/2019</a:t>
             </a:fld>
             <a:endParaRPr lang="en-US"/>
           </a:p>
@@ -1909,7 +1909,7 @@
           <a:p>
             <a:fld id="{846CE7D5-CF57-46EF-B807-FDD0502418D4}" type="datetimeFigureOut">
               <a:rPr lang="en-US" smtClean="0"/>
-              <a:t>10/3/2019</a:t>
+              <a:t>10/8/2019</a:t>
             </a:fld>
             <a:endParaRPr lang="en-US"/>
           </a:p>
@@ -2027,7 +2027,7 @@
           <a:p>
             <a:fld id="{846CE7D5-CF57-46EF-B807-FDD0502418D4}" type="datetimeFigureOut">
               <a:rPr lang="en-US" smtClean="0"/>
-              <a:t>10/3/2019</a:t>
+              <a:t>10/8/2019</a:t>
             </a:fld>
             <a:endParaRPr lang="en-US"/>
           </a:p>
@@ -2122,7 +2122,7 @@
           <a:p>
             <a:fld id="{846CE7D5-CF57-46EF-B807-FDD0502418D4}" type="datetimeFigureOut">
               <a:rPr lang="en-US" smtClean="0"/>
-              <a:t>10/3/2019</a:t>
+              <a:t>10/8/2019</a:t>
             </a:fld>
             <a:endParaRPr lang="en-US"/>
           </a:p>
@@ -2399,7 +2399,7 @@
           <a:p>
             <a:fld id="{846CE7D5-CF57-46EF-B807-FDD0502418D4}" type="datetimeFigureOut">
               <a:rPr lang="en-US" smtClean="0"/>
-              <a:t>10/3/2019</a:t>
+              <a:t>10/8/2019</a:t>
             </a:fld>
             <a:endParaRPr lang="en-US"/>
           </a:p>
@@ -2656,7 +2656,7 @@
           <a:p>
             <a:fld id="{846CE7D5-CF57-46EF-B807-FDD0502418D4}" type="datetimeFigureOut">
               <a:rPr lang="en-US" smtClean="0"/>
-              <a:t>10/3/2019</a:t>
+              <a:t>10/8/2019</a:t>
             </a:fld>
             <a:endParaRPr lang="en-US"/>
           </a:p>
@@ -2869,7 +2869,7 @@
           <a:p>
             <a:fld id="{846CE7D5-CF57-46EF-B807-FDD0502418D4}" type="datetimeFigureOut">
               <a:rPr lang="en-US" smtClean="0"/>
-              <a:t>10/3/2019</a:t>
+              <a:t>10/8/2019</a:t>
             </a:fld>
             <a:endParaRPr lang="en-US"/>
           </a:p>
@@ -3289,14 +3289,14 @@
           <p:nvPr>
             <p:extLst>
               <p:ext uri="{D42A27DB-BD31-4B8C-83A1-F6EECF244321}">
-                <p14:modId xmlns:p14="http://schemas.microsoft.com/office/powerpoint/2010/main" val="2924641499"/>
+                <p14:modId xmlns:p14="http://schemas.microsoft.com/office/powerpoint/2010/main" val="941608351"/>
               </p:ext>
             </p:extLst>
           </p:nvPr>
         </p:nvGraphicFramePr>
         <p:xfrm>
-          <a:off x="287822" y="7955265"/>
-          <a:ext cx="6339231" cy="1698225"/>
+          <a:off x="115451" y="7810528"/>
+          <a:ext cx="6619302" cy="2003532"/>
         </p:xfrm>
         <a:graphic>
           <a:graphicData uri="http://schemas.openxmlformats.org/drawingml/2006/table">
@@ -3305,28 +3305,28 @@
                 <a:tableStyleId>{5C22544A-7EE6-4342-B048-85BDC9FD1C3A}</a:tableStyleId>
               </a:tblPr>
               <a:tblGrid>
-                <a:gridCol w="1183472">
+                <a:gridCol w="1235758">
                   <a:extLst>
                     <a:ext uri="{9D8B030D-6E8A-4147-A177-3AD203B41FA5}">
                       <a16:colId xmlns:a16="http://schemas.microsoft.com/office/drawing/2014/main" val="4000343425"/>
                     </a:ext>
                   </a:extLst>
                 </a:gridCol>
-                <a:gridCol w="1811866">
+                <a:gridCol w="1891916">
                   <a:extLst>
                     <a:ext uri="{9D8B030D-6E8A-4147-A177-3AD203B41FA5}">
                       <a16:colId xmlns:a16="http://schemas.microsoft.com/office/drawing/2014/main" val="3219697129"/>
                     </a:ext>
                   </a:extLst>
                 </a:gridCol>
-                <a:gridCol w="1719982">
+                <a:gridCol w="1795972">
                   <a:extLst>
                     <a:ext uri="{9D8B030D-6E8A-4147-A177-3AD203B41FA5}">
                       <a16:colId xmlns:a16="http://schemas.microsoft.com/office/drawing/2014/main" val="1954095810"/>
                     </a:ext>
                   </a:extLst>
                 </a:gridCol>
-                <a:gridCol w="1623911">
+                <a:gridCol w="1695656">
                   <a:extLst>
                     <a:ext uri="{9D8B030D-6E8A-4147-A177-3AD203B41FA5}">
                       <a16:colId xmlns:a16="http://schemas.microsoft.com/office/drawing/2014/main" val="1938054758"/>
@@ -3334,7 +3334,7 @@
                   </a:extLst>
                 </a:gridCol>
               </a:tblGrid>
-              <a:tr h="249993">
+              <a:tr h="261625">
                 <a:tc>
                   <a:txBody>
                     <a:bodyPr/>
@@ -3347,7 +3347,7 @@
                         </a:rPr>
                         <a:t>​</a:t>
                       </a:r>
-                      <a:endParaRPr lang="en-US" sz="600" b="1">
+                      <a:endParaRPr lang="en-US" sz="600" b="1" dirty="0">
                         <a:solidFill>
                           <a:srgbClr val="FFFFFF"/>
                         </a:solidFill>
@@ -3447,7 +3447,7 @@
                   </a:ext>
                 </a:extLst>
               </a:tr>
-              <a:tr h="399088">
+              <a:tr h="580150">
                 <a:tc>
                   <a:txBody>
                     <a:bodyPr/>
@@ -3455,13 +3455,13 @@
                     <a:p>
                       <a:pPr fontAlgn="base"/>
                       <a:r>
-                        <a:rPr lang="en-US" sz="1000" b="1" dirty="0">
+                        <a:rPr lang="en-US" sz="1100" b="1" dirty="0">
                           <a:effectLst/>
                           <a:latin typeface="Garamond" panose="02020404030301010803" pitchFamily="18" charset="0"/>
                         </a:rPr>
                         <a:t>Bit-vector</a:t>
                       </a:r>
-                      <a:endParaRPr lang="en-US" sz="1000" b="1" dirty="0">
+                      <a:endParaRPr lang="en-US" sz="1100" b="1" dirty="0">
                         <a:latin typeface="Garamond" panose="02020404030301010803" pitchFamily="18" charset="0"/>
                       </a:endParaRPr>
                     </a:p>
@@ -3470,7 +3470,7 @@
                         <a:buNone/>
                       </a:pPr>
                       <a:r>
-                        <a:rPr lang="en-US" sz="1000" b="1" dirty="0">
+                        <a:rPr lang="en-US" sz="1100" b="1" dirty="0">
                           <a:effectLst/>
                           <a:latin typeface="Garamond" panose="02020404030301010803" pitchFamily="18" charset="0"/>
                         </a:rPr>
@@ -3487,7 +3487,7 @@
                     <a:p>
                       <a:pPr fontAlgn="base"/>
                       <a:r>
-                        <a:rPr lang="en-US" sz="1000" dirty="0">
+                        <a:rPr lang="en-US" sz="1100" dirty="0">
                           <a:effectLst/>
                           <a:latin typeface="Baskerville Old Face" panose="02020602080505020303" pitchFamily="18" charset="0"/>
                         </a:rPr>
@@ -3497,7 +3497,7 @@
                     <a:p>
                       <a:pPr fontAlgn="base"/>
                       <a:r>
-                        <a:rPr lang="en-US" sz="1000" dirty="0">
+                        <a:rPr lang="en-US" sz="1100" dirty="0">
                           <a:effectLst/>
                           <a:latin typeface="Baskerville Old Face" panose="02020602080505020303" pitchFamily="18" charset="0"/>
                         </a:rPr>
@@ -3514,7 +3514,7 @@
                     <a:p>
                       <a:pPr fontAlgn="base"/>
                       <a:r>
-                        <a:rPr lang="en-US" sz="1000" dirty="0">
+                        <a:rPr lang="en-US" sz="1100" dirty="0">
                           <a:effectLst/>
                           <a:latin typeface="Baskerville Old Face" panose="02020602080505020303" pitchFamily="18" charset="0"/>
                         </a:rPr>
@@ -3524,7 +3524,7 @@
                     <a:p>
                       <a:pPr fontAlgn="base"/>
                       <a:r>
-                        <a:rPr lang="en-US" sz="1000" dirty="0">
+                        <a:rPr lang="en-US" sz="1100" dirty="0">
                           <a:effectLst/>
                           <a:latin typeface="Baskerville Old Face" panose="02020602080505020303" pitchFamily="18" charset="0"/>
                         </a:rPr>
@@ -3541,7 +3541,7 @@
                     <a:p>
                       <a:pPr fontAlgn="base"/>
                       <a:r>
-                        <a:rPr lang="en-US" sz="1000" b="0" u="none" dirty="0">
+                        <a:rPr lang="en-US" sz="1100" b="0" u="none" dirty="0">
                           <a:solidFill>
                             <a:schemeClr val="bg1"/>
                           </a:solidFill>
@@ -3554,7 +3554,7 @@
                     <a:p>
                       <a:pPr fontAlgn="base"/>
                       <a:r>
-                        <a:rPr lang="en-US" sz="1000" b="0" u="none" dirty="0">
+                        <a:rPr lang="en-US" sz="1100" b="0" u="none" dirty="0">
                           <a:solidFill>
                             <a:schemeClr val="bg1"/>
                           </a:solidFill>
@@ -3577,7 +3577,7 @@
                   </a:ext>
                 </a:extLst>
               </a:tr>
-              <a:tr h="336672">
+              <a:tr h="352337">
                 <a:tc>
                   <a:txBody>
                     <a:bodyPr/>
@@ -3585,7 +3585,7 @@
                     <a:p>
                       <a:pPr fontAlgn="base"/>
                       <a:r>
-                        <a:rPr lang="en-US" sz="1000" b="1" dirty="0">
+                        <a:rPr lang="en-US" sz="1100" b="1" dirty="0">
                           <a:effectLst/>
                           <a:latin typeface="Garamond" panose="02020404030301010803" pitchFamily="18" charset="0"/>
                         </a:rPr>
@@ -3602,7 +3602,7 @@
                     <a:p>
                       <a:pPr fontAlgn="base"/>
                       <a:r>
-                        <a:rPr lang="en-US" sz="1000" dirty="0">
+                        <a:rPr lang="en-US" sz="1100" dirty="0">
                           <a:effectLst/>
                           <a:latin typeface="Baskerville Old Face" panose="02020602080505020303" pitchFamily="18" charset="0"/>
                         </a:rPr>
@@ -3619,7 +3619,7 @@
                     <a:p>
                       <a:pPr fontAlgn="base"/>
                       <a:r>
-                        <a:rPr lang="en-US" sz="1000" dirty="0">
+                        <a:rPr lang="en-US" sz="1100" dirty="0">
                           <a:effectLst/>
                           <a:latin typeface="Baskerville Old Face" panose="02020602080505020303" pitchFamily="18" charset="0"/>
                         </a:rPr>
@@ -3636,14 +3636,14 @@
                     <a:p>
                       <a:pPr fontAlgn="base"/>
                       <a:r>
-                        <a:rPr lang="en-US" sz="1000" b="0" u="none" dirty="0">
+                        <a:rPr lang="en-US" sz="1100" b="0" u="none" dirty="0">
                           <a:solidFill>
                             <a:schemeClr val="bg1"/>
                           </a:solidFill>
                           <a:effectLst/>
                           <a:latin typeface="Baskerville Old Face" panose="02020602080505020303" pitchFamily="18" charset="0"/>
                         </a:rPr>
-                        <a:t>Bit-vectors dependent over n​</a:t>
+                        <a:t>Bit-vectors dependent on n​</a:t>
                       </a:r>
                     </a:p>
                   </a:txBody>
@@ -3659,7 +3659,7 @@
                   </a:ext>
                 </a:extLst>
               </a:tr>
-              <a:tr h="347551">
+              <a:tr h="404710">
                 <a:tc>
                   <a:txBody>
                     <a:bodyPr/>
@@ -3667,7 +3667,7 @@
                     <a:p>
                       <a:pPr fontAlgn="base"/>
                       <a:r>
-                        <a:rPr lang="en-US" sz="1000" b="1" dirty="0">
+                        <a:rPr lang="en-US" sz="1100" b="1" dirty="0">
                           <a:effectLst/>
                           <a:latin typeface="Garamond" panose="02020404030301010803" pitchFamily="18" charset="0"/>
                         </a:rPr>
@@ -3684,7 +3684,7 @@
                     <a:p>
                       <a:pPr fontAlgn="base"/>
                       <a:r>
-                        <a:rPr lang="en-US" sz="1000" dirty="0">
+                        <a:rPr lang="en-US" sz="1100" dirty="0">
                           <a:effectLst/>
                           <a:latin typeface="Baskerville Old Face" panose="02020602080505020303" pitchFamily="18" charset="0"/>
                         </a:rPr>
@@ -3701,7 +3701,7 @@
                     <a:p>
                       <a:pPr fontAlgn="base"/>
                       <a:r>
-                        <a:rPr lang="en-US" sz="1000" dirty="0">
+                        <a:rPr lang="en-US" sz="1100" dirty="0">
                           <a:effectLst/>
                           <a:latin typeface="Baskerville Old Face" panose="02020602080505020303" pitchFamily="18" charset="0"/>
                         </a:rPr>
@@ -3718,7 +3718,7 @@
                     <a:p>
                       <a:pPr fontAlgn="base"/>
                       <a:r>
-                        <a:rPr lang="en-US" sz="1000" b="0" u="none" dirty="0">
+                        <a:rPr lang="en-US" sz="1100" b="0" u="none" dirty="0">
                           <a:solidFill>
                             <a:schemeClr val="bg1"/>
                           </a:solidFill>
@@ -3731,7 +3731,7 @@
                     <a:p>
                       <a:pPr fontAlgn="base"/>
                       <a:r>
-                        <a:rPr lang="en-US" sz="1000" b="0" u="none" dirty="0">
+                        <a:rPr lang="en-US" sz="1100" b="0" u="none" dirty="0">
                           <a:solidFill>
                             <a:schemeClr val="bg1"/>
                           </a:solidFill>
@@ -3754,7 +3754,7 @@
                   </a:ext>
                 </a:extLst>
               </a:tr>
-              <a:tr h="347551">
+              <a:tr h="404710">
                 <a:tc>
                   <a:txBody>
                     <a:bodyPr/>
@@ -3762,7 +3762,7 @@
                     <a:p>
                       <a:pPr fontAlgn="base"/>
                       <a:r>
-                        <a:rPr lang="en-US" sz="1000" b="1" dirty="0">
+                        <a:rPr lang="en-US" sz="1100" b="1" dirty="0">
                           <a:effectLst/>
                           <a:latin typeface="Garamond" panose="02020404030301010803" pitchFamily="18" charset="0"/>
                         </a:rPr>
@@ -3779,7 +3779,7 @@
                     <a:p>
                       <a:pPr fontAlgn="base"/>
                       <a:r>
-                        <a:rPr lang="en-US" sz="1000" dirty="0">
+                        <a:rPr lang="en-US" sz="1100" dirty="0">
                           <a:effectLst/>
                           <a:latin typeface="Baskerville Old Face" panose="02020602080505020303" pitchFamily="18" charset="0"/>
                         </a:rPr>
@@ -3789,7 +3789,7 @@
                     <a:p>
                       <a:pPr fontAlgn="base"/>
                       <a:r>
-                        <a:rPr lang="en-US" sz="1000" dirty="0">
+                        <a:rPr lang="en-US" sz="1100" dirty="0">
                           <a:effectLst/>
                           <a:latin typeface="Baskerville Old Face" panose="02020602080505020303" pitchFamily="18" charset="0"/>
                         </a:rPr>
@@ -3806,7 +3806,7 @@
                     <a:p>
                       <a:pPr fontAlgn="base"/>
                       <a:r>
-                        <a:rPr lang="en-US" sz="1000" dirty="0">
+                        <a:rPr lang="en-US" sz="1100" dirty="0">
                           <a:effectLst/>
                           <a:latin typeface="Baskerville Old Face" panose="02020602080505020303" pitchFamily="18" charset="0"/>
                         </a:rPr>
@@ -3816,7 +3816,7 @@
                     <a:p>
                       <a:pPr fontAlgn="base"/>
                       <a:r>
-                        <a:rPr lang="en-US" sz="1000" dirty="0">
+                        <a:rPr lang="en-US" sz="1100" dirty="0">
                           <a:effectLst/>
                           <a:latin typeface="Baskerville Old Face" panose="02020602080505020303" pitchFamily="18" charset="0"/>
                         </a:rPr>
@@ -3833,7 +3833,7 @@
                     <a:p>
                       <a:pPr fontAlgn="base"/>
                       <a:r>
-                        <a:rPr lang="en-US" sz="1000" b="0" u="none" dirty="0">
+                        <a:rPr lang="en-US" sz="1100" b="0" u="none" dirty="0">
                           <a:solidFill>
                             <a:schemeClr val="bg1"/>
                           </a:solidFill>
@@ -3846,7 +3846,7 @@
                     <a:p>
                       <a:pPr fontAlgn="base"/>
                       <a:r>
-                        <a:rPr lang="en-US" sz="1000" b="0" u="none" dirty="0">
+                        <a:rPr lang="en-US" sz="1100" b="0" u="none" dirty="0">
                           <a:solidFill>
                             <a:schemeClr val="bg1"/>
                           </a:solidFill>
@@ -4074,25 +4074,11 @@
               </a:spcBef>
             </a:pPr>
             <a:r>
-              <a:rPr lang="en-US" sz="1200" dirty="0">
+              <a:rPr lang="en-US" sz="1300" dirty="0">
                 <a:latin typeface="Baskerville Old Face" panose="02020602080505020303" pitchFamily="18" charset="0"/>
                 <a:cs typeface="Calibri"/>
               </a:rPr>
-              <a:t>The </a:t>
-            </a:r>
-            <a:r>
-              <a:rPr lang="en-US" sz="1200">
-                <a:latin typeface="Baskerville Old Face" panose="02020602080505020303" pitchFamily="18" charset="0"/>
-                <a:cs typeface="Calibri"/>
-              </a:rPr>
-              <a:t>CVC4 SMT-solver uses </a:t>
-            </a:r>
-            <a:r>
-              <a:rPr lang="en-US" sz="1200" dirty="0">
-                <a:latin typeface="Baskerville Old Face" panose="02020602080505020303" pitchFamily="18" charset="0"/>
-                <a:cs typeface="Calibri"/>
-              </a:rPr>
-              <a:t>invertibility equivalences in a quantifier-instantiation technique that deals with solving quantified bit-vector formulas.</a:t>
+              <a:t>The CVC4 SMT-solver uses invertibility equivalences to solve quantified bit-vector formulas</a:t>
             </a:r>
           </a:p>
           <a:p>
@@ -4105,11 +4091,11 @@
               </a:spcBef>
             </a:pPr>
             <a:r>
-              <a:rPr lang="en-US" sz="1200" dirty="0">
+              <a:rPr lang="en-US" sz="1300" dirty="0">
                 <a:latin typeface="Baskerville Old Face" panose="02020602080505020303" pitchFamily="18" charset="0"/>
                 <a:cs typeface="Calibri"/>
               </a:rPr>
-              <a:t>Proofs of these equivalences for arbitrary bit-widths certify the solver’s results on quantified bit-vector formulas.</a:t>
+              <a:t>Proofs of these equivalences for arbitrary bit-widths certify the solver’s results</a:t>
             </a:r>
           </a:p>
         </p:txBody>
@@ -4313,7 +4299,7 @@
               <a:buNone/>
             </a:pPr>
             <a:r>
-              <a:rPr lang="en-US" sz="1200" b="1" dirty="0">
+              <a:rPr lang="en-US" sz="1400" b="1" dirty="0">
                 <a:latin typeface="Garamond" panose="02020404030301010803" pitchFamily="18" charset="0"/>
                 <a:cs typeface="Helvetica" panose="020B0604020202020204" pitchFamily="34" charset="0"/>
               </a:rPr>
@@ -4331,7 +4317,12 @@
               <a:buNone/>
             </a:pPr>
             <a:r>
-              <a:rPr lang="en-US" sz="1200" u="sng" dirty="0">
+              <a:rPr lang="en-US" sz="1300" b="1" dirty="0">
+                <a:solidFill>
+                  <a:schemeClr val="accent1">
+                    <a:lumMod val="50000"/>
+                  </a:schemeClr>
+                </a:solidFill>
                 <a:latin typeface="Garamond" panose="02020404030301010803" pitchFamily="18" charset="0"/>
                 <a:cs typeface="Calibri" panose="020F0502020204030204"/>
               </a:rPr>
@@ -4349,24 +4340,24 @@
               <a:buNone/>
             </a:pPr>
             <a:r>
-              <a:rPr lang="en-US" sz="1200" dirty="0">
+              <a:rPr lang="en-US" sz="1300" dirty="0">
                 <a:latin typeface="Baskerville Old Face" panose="02020602080505020303" pitchFamily="18" charset="0"/>
               </a:rPr>
               <a:t>[</a:t>
             </a:r>
             <a:r>
-              <a:rPr lang="en-US" sz="1200" dirty="0" err="1">
+              <a:rPr lang="en-US" sz="1300" dirty="0" err="1">
                 <a:latin typeface="Baskerville Old Face" panose="02020602080505020303" pitchFamily="18" charset="0"/>
               </a:rPr>
               <a:t>Niemetz</a:t>
             </a:r>
             <a:r>
-              <a:rPr lang="en-US" sz="1200" dirty="0">
+              <a:rPr lang="en-US" sz="1300" dirty="0">
                 <a:latin typeface="Baskerville Old Face" panose="02020602080505020303" pitchFamily="18" charset="0"/>
               </a:rPr>
               <a:t> et al., CAV 2018] </a:t>
             </a:r>
-            <a:endParaRPr lang="en-US" sz="1200" dirty="0">
+            <a:endParaRPr lang="en-US" sz="1300" dirty="0">
               <a:latin typeface="Baskerville Old Face" panose="02020602080505020303" pitchFamily="18" charset="0"/>
               <a:cs typeface="Calibri" panose="020F0502020204030204"/>
             </a:endParaRPr>
@@ -4381,12 +4372,12 @@
               </a:spcBef>
             </a:pPr>
             <a:r>
-              <a:rPr lang="en-US" sz="1200" dirty="0">
+              <a:rPr lang="en-US" sz="1300" dirty="0">
                 <a:latin typeface="Baskerville Old Face" panose="02020602080505020303" pitchFamily="18" charset="0"/>
               </a:rPr>
               <a:t>generated 162 invertibility equivalences</a:t>
             </a:r>
-            <a:endParaRPr lang="en-US" sz="1200" dirty="0">
+            <a:endParaRPr lang="en-US" sz="1300" dirty="0">
               <a:latin typeface="Baskerville Old Face" panose="02020602080505020303" pitchFamily="18" charset="0"/>
               <a:cs typeface="Calibri"/>
             </a:endParaRPr>
@@ -4401,12 +4392,12 @@
               </a:spcBef>
             </a:pPr>
             <a:r>
-              <a:rPr lang="en-US" sz="1200" dirty="0">
+              <a:rPr lang="en-US" sz="1300" dirty="0">
                 <a:latin typeface="Baskerville Old Face" panose="02020602080505020303" pitchFamily="18" charset="0"/>
               </a:rPr>
               <a:t>proved them using SMT-solvers for bit-widths up to 65</a:t>
             </a:r>
-            <a:endParaRPr lang="en-US" sz="1200" dirty="0">
+            <a:endParaRPr lang="en-US" sz="1300" dirty="0">
               <a:latin typeface="Baskerville Old Face" panose="02020602080505020303" pitchFamily="18" charset="0"/>
               <a:cs typeface="Calibri"/>
             </a:endParaRPr>
@@ -4422,24 +4413,24 @@
               <a:buNone/>
             </a:pPr>
             <a:r>
-              <a:rPr lang="en-US" sz="1200" dirty="0">
+              <a:rPr lang="en-US" sz="1300" dirty="0">
                 <a:latin typeface="Baskerville Old Face" panose="02020602080505020303" pitchFamily="18" charset="0"/>
               </a:rPr>
               <a:t>[</a:t>
             </a:r>
             <a:r>
-              <a:rPr lang="en-US" sz="1200" dirty="0" err="1">
+              <a:rPr lang="en-US" sz="1300" dirty="0" err="1">
                 <a:latin typeface="Baskerville Old Face" panose="02020602080505020303" pitchFamily="18" charset="0"/>
               </a:rPr>
               <a:t>Niemetz</a:t>
             </a:r>
             <a:r>
-              <a:rPr lang="en-US" sz="1200" dirty="0">
+              <a:rPr lang="en-US" sz="1300" dirty="0">
                 <a:latin typeface="Baskerville Old Face" panose="02020602080505020303" pitchFamily="18" charset="0"/>
               </a:rPr>
               <a:t> et al., CADE 2019] </a:t>
             </a:r>
-            <a:endParaRPr lang="en-US" sz="1200" dirty="0">
+            <a:endParaRPr lang="en-US" sz="1300" dirty="0">
               <a:latin typeface="Baskerville Old Face" panose="02020602080505020303" pitchFamily="18" charset="0"/>
               <a:cs typeface="Calibri" panose="020F0502020204030204"/>
             </a:endParaRPr>
@@ -4454,12 +4445,12 @@
               </a:spcBef>
             </a:pPr>
             <a:r>
-              <a:rPr lang="en-US" sz="1200" dirty="0">
+              <a:rPr lang="en-US" sz="1300" dirty="0">
                 <a:latin typeface="Baskerville Old Face" panose="02020602080505020303" pitchFamily="18" charset="0"/>
               </a:rPr>
               <a:t>encoded the equivalences in theories supported by SMT-solvers </a:t>
             </a:r>
-            <a:endParaRPr lang="en-US" sz="1200" dirty="0">
+            <a:endParaRPr lang="en-US" sz="1300" dirty="0">
               <a:latin typeface="Baskerville Old Face" panose="02020602080505020303" pitchFamily="18" charset="0"/>
               <a:cs typeface="Calibri"/>
             </a:endParaRPr>
@@ -4474,12 +4465,12 @@
               </a:spcBef>
             </a:pPr>
             <a:r>
-              <a:rPr lang="en-US" sz="1200" dirty="0">
+              <a:rPr lang="en-US" sz="1300" dirty="0">
                 <a:latin typeface="Baskerville Old Face" panose="02020602080505020303" pitchFamily="18" charset="0"/>
               </a:rPr>
-              <a:t>verified equivalences for parametric bit-widths</a:t>
-            </a:r>
-            <a:endParaRPr lang="en-US" sz="1200" dirty="0">
+              <a:t>verified equivalences for parametric widths</a:t>
+            </a:r>
+            <a:endParaRPr lang="en-US" sz="1300" dirty="0">
               <a:latin typeface="Baskerville Old Face" panose="02020602080505020303" pitchFamily="18" charset="0"/>
               <a:cs typeface="Calibri"/>
             </a:endParaRPr>
@@ -4494,11 +4485,27 @@
               </a:spcBef>
             </a:pPr>
             <a:r>
-              <a:rPr lang="en-US" sz="1200" dirty="0">
+              <a:rPr lang="en-US" sz="1300" dirty="0">
                 <a:latin typeface="Baskerville Old Face" panose="02020602080505020303" pitchFamily="18" charset="0"/>
               </a:rPr>
-              <a:t>approach succeeded on under 75% of the equivalences</a:t>
-            </a:r>
+              <a:t>succeeded on </a:t>
+            </a:r>
+            <a:r>
+              <a:rPr lang="en-US" sz="1400" dirty="0">
+                <a:latin typeface="Baskerville Old Face" panose="02020602080505020303" pitchFamily="18" charset="0"/>
+              </a:rPr>
+              <a:t>≈</a:t>
+            </a:r>
+            <a:r>
+              <a:rPr lang="en-US" sz="1300" dirty="0">
+                <a:latin typeface="Baskerville Old Face" panose="02020602080505020303" pitchFamily="18" charset="0"/>
+              </a:rPr>
+              <a:t>75% of the equivalences</a:t>
+            </a:r>
+            <a:endParaRPr lang="en-US" sz="1300" dirty="0">
+              <a:latin typeface="Gill Sans MT" panose="020B0502020104020203" pitchFamily="34" charset="0"/>
+              <a:cs typeface="Calibri"/>
+            </a:endParaRPr>
           </a:p>
           <a:p>
             <a:pPr marL="0" indent="0">
@@ -4510,45 +4517,42 @@
               </a:spcBef>
               <a:buNone/>
             </a:pPr>
-            <a:endParaRPr lang="en-US" sz="1200" dirty="0">
-              <a:latin typeface="Gill Sans MT" panose="020B0502020104020203" pitchFamily="34" charset="0"/>
-              <a:cs typeface="Calibri"/>
-            </a:endParaRPr>
-          </a:p>
-          <a:p>
-            <a:pPr marL="0" indent="0">
-              <a:lnSpc>
-                <a:spcPct val="100000"/>
-              </a:lnSpc>
-              <a:spcBef>
-                <a:spcPts val="400"/>
-              </a:spcBef>
-              <a:buNone/>
-            </a:pPr>
-            <a:r>
-              <a:rPr lang="en-US" sz="1200" u="sng" dirty="0">
+            <a:r>
+              <a:rPr lang="en-US" sz="1300" b="1" dirty="0">
+                <a:solidFill>
+                  <a:schemeClr val="accent1">
+                    <a:lumMod val="50000"/>
+                  </a:schemeClr>
+                </a:solidFill>
                 <a:latin typeface="Garamond" panose="02020404030301010803" pitchFamily="18" charset="0"/>
                 <a:cs typeface="Calibri"/>
               </a:rPr>
               <a:t>This work</a:t>
             </a:r>
-            <a:endParaRPr lang="en-US" sz="1200" u="sng" dirty="0">
+            <a:endParaRPr lang="en-US" sz="1300" b="1" dirty="0">
+              <a:solidFill>
+                <a:schemeClr val="accent1">
+                  <a:lumMod val="50000"/>
+                </a:schemeClr>
+              </a:solidFill>
               <a:latin typeface="Garamond" panose="02020404030301010803" pitchFamily="18" charset="0"/>
               <a:ea typeface="+mn-lt"/>
               <a:cs typeface="+mn-lt"/>
             </a:endParaRPr>
           </a:p>
           <a:p>
-            <a:pPr marL="160734" indent="-160734">
+            <a:pPr>
               <a:lnSpc>
                 <a:spcPct val="100000"/>
               </a:lnSpc>
               <a:spcBef>
                 <a:spcPts val="400"/>
               </a:spcBef>
+              <a:buFont typeface="+mj-lt"/>
+              <a:buAutoNum type="arabicPeriod"/>
             </a:pPr>
             <a:r>
-              <a:rPr lang="en-US" sz="1200" dirty="0">
+              <a:rPr lang="en-US" sz="1300" dirty="0">
                 <a:latin typeface="Baskerville Old Face" panose="02020602080505020303" pitchFamily="18" charset="0"/>
                 <a:ea typeface="+mn-lt"/>
                 <a:cs typeface="+mn-lt"/>
@@ -4557,16 +4561,18 @@
             </a:r>
           </a:p>
           <a:p>
-            <a:pPr marL="160734" indent="-160734">
+            <a:pPr>
               <a:lnSpc>
                 <a:spcPct val="100000"/>
               </a:lnSpc>
               <a:spcBef>
                 <a:spcPts val="400"/>
               </a:spcBef>
+              <a:buFont typeface="+mj-lt"/>
+              <a:buAutoNum type="arabicPeriod"/>
             </a:pPr>
             <a:r>
-              <a:rPr lang="en-US" sz="1200" dirty="0">
+              <a:rPr lang="en-US" sz="1300" dirty="0">
                 <a:latin typeface="Baskerville Old Face" panose="02020602080505020303" pitchFamily="18" charset="0"/>
                 <a:ea typeface="+mn-lt"/>
                 <a:cs typeface="+mn-lt"/>
@@ -4575,23 +4581,25 @@
             </a:r>
           </a:p>
           <a:p>
-            <a:pPr marL="160734" indent="-160734">
+            <a:pPr>
               <a:lnSpc>
                 <a:spcPct val="100000"/>
               </a:lnSpc>
               <a:spcBef>
                 <a:spcPts val="400"/>
               </a:spcBef>
+              <a:buFont typeface="+mj-lt"/>
+              <a:buAutoNum type="arabicPeriod"/>
             </a:pPr>
             <a:r>
-              <a:rPr lang="en-US" sz="1200" dirty="0">
+              <a:rPr lang="en-US" sz="1300" dirty="0">
                 <a:latin typeface="Baskerville Old Face" panose="02020602080505020303" pitchFamily="18" charset="0"/>
                 <a:ea typeface="+mn-lt"/>
                 <a:cs typeface="+mn-lt"/>
               </a:rPr>
               <a:t>proved 18 of them for arbitrary bit-width</a:t>
             </a:r>
-            <a:endParaRPr lang="en-US" sz="1200" dirty="0">
+            <a:endParaRPr lang="en-US" sz="1300" dirty="0">
               <a:latin typeface="Baskerville Old Face" panose="02020602080505020303" pitchFamily="18" charset="0"/>
               <a:cs typeface="Calibri"/>
             </a:endParaRPr>
@@ -4603,7 +4611,7 @@
               </a:lnSpc>
               <a:buNone/>
             </a:pPr>
-            <a:endParaRPr lang="en-US" sz="1200" dirty="0">
+            <a:endParaRPr lang="en-US" sz="1300" dirty="0">
               <a:latin typeface="Gill Sans MT" panose="020B0502020104020203" pitchFamily="34" charset="0"/>
               <a:cs typeface="Calibri"/>
             </a:endParaRPr>
@@ -4626,8 +4634,8 @@
         </p:nvSpPr>
         <p:spPr>
           <a:xfrm>
-            <a:off x="1422724" y="4428782"/>
-            <a:ext cx="621150" cy="187448"/>
+            <a:off x="1384620" y="4428782"/>
+            <a:ext cx="681500" cy="187448"/>
           </a:xfrm>
           <a:prstGeom prst="rect">
             <a:avLst/>
@@ -4658,7 +4666,7 @@
           </a:lstStyle>
           <a:p>
             <a:r>
-              <a:rPr lang="en-US" sz="1200" b="1" dirty="0">
+              <a:rPr lang="en-US" sz="1400" b="1" dirty="0">
                 <a:latin typeface="Garamond" panose="02020404030301010803" pitchFamily="18" charset="0"/>
                 <a:cs typeface="Calibri Light"/>
               </a:rPr>
@@ -4683,7 +4691,7 @@
         </p:nvSpPr>
         <p:spPr>
           <a:xfrm>
-            <a:off x="2479117" y="7663363"/>
+            <a:off x="2479117" y="7544094"/>
             <a:ext cx="2498894" cy="322568"/>
           </a:xfrm>
           <a:prstGeom prst="rect">
@@ -4715,14 +4723,14 @@
           </a:lstStyle>
           <a:p>
             <a:r>
-              <a:rPr lang="en-US" sz="1200" b="1" dirty="0" err="1">
+              <a:rPr lang="en-US" sz="1400" b="1" dirty="0" err="1">
                 <a:latin typeface="Garamond" panose="02020404030301010803" pitchFamily="18" charset="0"/>
                 <a:cs typeface="Calibri Light"/>
               </a:rPr>
               <a:t>Bitvector</a:t>
             </a:r>
             <a:r>
-              <a:rPr lang="en-US" sz="1200" b="1" dirty="0">
+              <a:rPr lang="en-US" sz="1400" b="1" dirty="0">
                 <a:latin typeface="Garamond" panose="02020404030301010803" pitchFamily="18" charset="0"/>
                 <a:cs typeface="Calibri Light"/>
               </a:rPr>
@@ -4733,10 +4741,10 @@
       </p:sp>
       <p:pic>
         <p:nvPicPr>
-          <p:cNvPr id="46" name="Picture 45">
+          <p:cNvPr id="8" name="Picture 7">
             <a:extLst>
               <a:ext uri="{FF2B5EF4-FFF2-40B4-BE49-F238E27FC236}">
-                <a16:creationId xmlns:a16="http://schemas.microsoft.com/office/drawing/2014/main" id="{F8D2020A-1916-4685-BCFC-CA052D82B97F}"/>
+                <a16:creationId xmlns:a16="http://schemas.microsoft.com/office/drawing/2014/main" id="{C431FB15-9104-4DF2-9C48-573A37F19B5E}"/>
               </a:ext>
             </a:extLst>
           </p:cNvPr>
@@ -4750,7 +4758,7 @@
           </p:nvPr>
         </p:nvPicPr>
         <p:blipFill>
-          <a:blip r:embed="rId16" cstate="print">
+          <a:blip r:embed="rId17" cstate="print">
             <a:extLst>
               <a:ext uri="{28A0092B-C50C-407E-A947-70E740481C1C}">
                 <a14:useLocalDpi xmlns:a14="http://schemas.microsoft.com/office/drawing/2010/main" val="0"/>
@@ -4763,8 +4771,8 @@
         </p:blipFill>
         <p:spPr>
           <a:xfrm>
-            <a:off x="164594" y="1175745"/>
-            <a:ext cx="3104158" cy="672812"/>
+            <a:off x="132573" y="1400664"/>
+            <a:ext cx="3203050" cy="481271"/>
           </a:xfrm>
           <a:prstGeom prst="rect">
             <a:avLst/>
@@ -4974,7 +4982,7 @@
           <p:nvPr/>
         </p:nvPicPr>
         <p:blipFill>
-          <a:blip r:embed="rId17" cstate="print">
+          <a:blip r:embed="rId18" cstate="print">
             <a:extLst>
               <a:ext uri="{28A0092B-C50C-407E-A947-70E740481C1C}">
                 <a14:useLocalDpi xmlns:a14="http://schemas.microsoft.com/office/drawing/2010/main" val="0"/>
@@ -5194,7 +5202,7 @@
               <a:buNone/>
             </a:pPr>
             <a:r>
-              <a:rPr lang="en-US" sz="1200" b="1" dirty="0">
+              <a:rPr lang="en-US" sz="1400" b="1" dirty="0">
                 <a:latin typeface="Garamond" panose="02020404030301010803" pitchFamily="18" charset="0"/>
                 <a:cs typeface="Helvetica" panose="020B0604020202020204" pitchFamily="34" charset="0"/>
               </a:rPr>
@@ -5202,13 +5210,14 @@
             </a:r>
           </a:p>
           <a:p>
-            <a:pPr>
+            <a:pPr marL="0" indent="0">
               <a:lnSpc>
                 <a:spcPct val="60000"/>
               </a:lnSpc>
+              <a:buNone/>
             </a:pPr>
             <a:r>
-              <a:rPr lang="en-US" sz="1200" b="1" dirty="0">
+              <a:rPr lang="en-US" sz="1300" b="1" dirty="0">
                 <a:latin typeface="Garamond" panose="02020404030301010803" pitchFamily="18" charset="0"/>
                 <a:cs typeface="Helvetica" panose="020B0604020202020204" pitchFamily="34" charset="0"/>
               </a:rPr>
@@ -5216,13 +5225,14 @@
             </a:r>
           </a:p>
           <a:p>
-            <a:pPr>
+            <a:pPr marL="0" indent="0">
               <a:lnSpc>
                 <a:spcPct val="60000"/>
               </a:lnSpc>
+              <a:buNone/>
             </a:pPr>
             <a:r>
-              <a:rPr lang="en-US" sz="1200" b="1" dirty="0">
+              <a:rPr lang="en-US" sz="1300" b="1" dirty="0">
                 <a:latin typeface="Garamond" panose="02020404030301010803" pitchFamily="18" charset="0"/>
                 <a:cs typeface="Helvetica" panose="020B0604020202020204" pitchFamily="34" charset="0"/>
               </a:rPr>
@@ -5230,13 +5240,14 @@
             </a:r>
           </a:p>
           <a:p>
-            <a:pPr>
+            <a:pPr marL="0" indent="0">
               <a:lnSpc>
                 <a:spcPct val="60000"/>
               </a:lnSpc>
+              <a:buNone/>
             </a:pPr>
             <a:r>
-              <a:rPr lang="en-US" sz="1200" b="1" dirty="0">
+              <a:rPr lang="en-US" sz="1300" b="1" dirty="0">
                 <a:latin typeface="Garamond" panose="02020404030301010803" pitchFamily="18" charset="0"/>
                 <a:cs typeface="Helvetica" panose="020B0604020202020204" pitchFamily="34" charset="0"/>
               </a:rPr>
@@ -5264,7 +5275,7 @@
           </p:nvPr>
         </p:nvPicPr>
         <p:blipFill>
-          <a:blip r:embed="rId18" cstate="print">
+          <a:blip r:embed="rId19" cstate="print">
             <a:extLst>
               <a:ext uri="{28A0092B-C50C-407E-A947-70E740481C1C}">
                 <a14:useLocalDpi xmlns:a14="http://schemas.microsoft.com/office/drawing/2010/main" val="0"/>
@@ -5304,7 +5315,7 @@
           </p:nvPr>
         </p:nvPicPr>
         <p:blipFill>
-          <a:blip r:embed="rId19" cstate="print">
+          <a:blip r:embed="rId20" cstate="print">
             <a:extLst>
               <a:ext uri="{28A0092B-C50C-407E-A947-70E740481C1C}">
                 <a14:useLocalDpi xmlns:a14="http://schemas.microsoft.com/office/drawing/2010/main" val="0"/>
@@ -5344,7 +5355,7 @@
           </p:nvPr>
         </p:nvPicPr>
         <p:blipFill>
-          <a:blip r:embed="rId20" cstate="print">
+          <a:blip r:embed="rId21" cstate="print">
             <a:extLst>
               <a:ext uri="{28A0092B-C50C-407E-A947-70E740481C1C}">
                 <a14:useLocalDpi xmlns:a14="http://schemas.microsoft.com/office/drawing/2010/main" val="0"/>
@@ -5384,7 +5395,7 @@
           </p:nvPr>
         </p:nvPicPr>
         <p:blipFill>
-          <a:blip r:embed="rId21" cstate="print">
+          <a:blip r:embed="rId22" cstate="print">
             <a:extLst>
               <a:ext uri="{28A0092B-C50C-407E-A947-70E740481C1C}">
                 <a14:useLocalDpi xmlns:a14="http://schemas.microsoft.com/office/drawing/2010/main" val="0"/>
@@ -5424,7 +5435,7 @@
           </p:nvPr>
         </p:nvPicPr>
         <p:blipFill>
-          <a:blip r:embed="rId22" cstate="print">
+          <a:blip r:embed="rId23" cstate="print">
             <a:extLst>
               <a:ext uri="{28A0092B-C50C-407E-A947-70E740481C1C}">
                 <a14:useLocalDpi xmlns:a14="http://schemas.microsoft.com/office/drawing/2010/main" val="0"/>
@@ -5461,7 +5472,7 @@
         </p:nvSpPr>
         <p:spPr>
           <a:xfrm>
-            <a:off x="3144176" y="5450289"/>
+            <a:off x="3144176" y="5315117"/>
             <a:ext cx="3161803" cy="2096597"/>
           </a:xfrm>
           <a:prstGeom prst="rect">
@@ -5644,7 +5655,7 @@
               <a:buNone/>
             </a:pPr>
             <a:r>
-              <a:rPr lang="en-US" sz="1200" b="1" dirty="0">
+              <a:rPr lang="en-US" sz="1400" b="1" dirty="0">
                 <a:latin typeface="Garamond" panose="02020404030301010803" pitchFamily="18" charset="0"/>
                 <a:cs typeface="Helvetica" panose="020B0604020202020204" pitchFamily="34" charset="0"/>
               </a:rPr>
@@ -5659,7 +5670,12 @@
               <a:buNone/>
             </a:pPr>
             <a:r>
-              <a:rPr lang="en-US" sz="1200" u="sng" dirty="0">
+              <a:rPr lang="en-US" sz="1300" b="1" dirty="0">
+                <a:solidFill>
+                  <a:schemeClr val="accent1">
+                    <a:lumMod val="50000"/>
+                  </a:schemeClr>
+                </a:solidFill>
                 <a:latin typeface="Garamond" panose="02020404030301010803" pitchFamily="18" charset="0"/>
                 <a:cs typeface="Helvetica" panose="020B0604020202020204" pitchFamily="34" charset="0"/>
               </a:rPr>
@@ -5667,45 +5683,48 @@
             </a:r>
           </a:p>
           <a:p>
-            <a:pPr>
+            <a:pPr marL="0" indent="0">
               <a:lnSpc>
                 <a:spcPct val="60000"/>
               </a:lnSpc>
+              <a:buNone/>
             </a:pPr>
             <a:r>
-              <a:rPr lang="en-US" sz="1200" dirty="0">
+              <a:rPr lang="en-US" sz="1300" dirty="0">
                 <a:latin typeface="Baskerville Old Face" panose="02020602080505020303" pitchFamily="18" charset="0"/>
                 <a:cs typeface="Helvetica" panose="020B0604020202020204" pitchFamily="34" charset="0"/>
               </a:rPr>
-              <a:t>Arithmetic:</a:t>
-            </a:r>
-          </a:p>
-          <a:p>
-            <a:pPr>
+              <a:t>   Arithmetic:</a:t>
+            </a:r>
+          </a:p>
+          <a:p>
+            <a:pPr marL="0" indent="0">
               <a:lnSpc>
                 <a:spcPct val="60000"/>
               </a:lnSpc>
+              <a:buNone/>
             </a:pPr>
             <a:r>
-              <a:rPr lang="en-US" sz="1200" dirty="0">
+              <a:rPr lang="en-US" sz="1300" dirty="0">
                 <a:latin typeface="Baskerville Old Face" panose="02020602080505020303" pitchFamily="18" charset="0"/>
                 <a:cs typeface="Helvetica" panose="020B0604020202020204" pitchFamily="34" charset="0"/>
               </a:rPr>
-              <a:t>Bit-wise logical:</a:t>
-            </a:r>
-          </a:p>
-          <a:p>
-            <a:pPr>
+              <a:t>   Bit-wise logical:</a:t>
+            </a:r>
+          </a:p>
+          <a:p>
+            <a:pPr marL="0" indent="0">
               <a:lnSpc>
                 <a:spcPct val="60000"/>
               </a:lnSpc>
+              <a:buNone/>
             </a:pPr>
             <a:r>
-              <a:rPr lang="en-US" sz="1200" dirty="0">
+              <a:rPr lang="en-US" sz="1300" dirty="0">
                 <a:latin typeface="Baskerville Old Face" panose="02020602080505020303" pitchFamily="18" charset="0"/>
                 <a:cs typeface="Helvetica" panose="020B0604020202020204" pitchFamily="34" charset="0"/>
               </a:rPr>
-              <a:t>Comparison:</a:t>
+              <a:t>   Comparison:</a:t>
             </a:r>
           </a:p>
           <a:p>
@@ -5716,7 +5735,12 @@
               <a:buNone/>
             </a:pPr>
             <a:r>
-              <a:rPr lang="en-US" sz="1200" u="sng" dirty="0">
+              <a:rPr lang="en-US" sz="1300" b="1" dirty="0">
+                <a:solidFill>
+                  <a:schemeClr val="accent1">
+                    <a:lumMod val="50000"/>
+                  </a:schemeClr>
+                </a:solidFill>
                 <a:latin typeface="Garamond" panose="02020404030301010803" pitchFamily="18" charset="0"/>
                 <a:cs typeface="Helvetica" panose="020B0604020202020204" pitchFamily="34" charset="0"/>
               </a:rPr>
@@ -5724,45 +5748,48 @@
             </a:r>
           </a:p>
           <a:p>
-            <a:pPr>
+            <a:pPr marL="0" indent="0">
               <a:lnSpc>
                 <a:spcPct val="60000"/>
               </a:lnSpc>
+              <a:buNone/>
             </a:pPr>
             <a:r>
-              <a:rPr lang="en-US" sz="1200" dirty="0">
+              <a:rPr lang="en-US" sz="1300" dirty="0">
                 <a:latin typeface="Baskerville Old Face" panose="02020602080505020303" pitchFamily="18" charset="0"/>
                 <a:cs typeface="Helvetica" panose="020B0604020202020204" pitchFamily="34" charset="0"/>
               </a:rPr>
-              <a:t>Comparison:</a:t>
-            </a:r>
-          </a:p>
-          <a:p>
-            <a:pPr>
+              <a:t>   Comparison:</a:t>
+            </a:r>
+          </a:p>
+          <a:p>
+            <a:pPr marL="0" indent="0">
               <a:lnSpc>
                 <a:spcPct val="60000"/>
               </a:lnSpc>
+              <a:buNone/>
             </a:pPr>
             <a:r>
-              <a:rPr lang="en-US" sz="1200" dirty="0">
+              <a:rPr lang="en-US" sz="1300" dirty="0">
                 <a:latin typeface="Baskerville Old Face" panose="02020602080505020303" pitchFamily="18" charset="0"/>
                 <a:cs typeface="Helvetica" panose="020B0604020202020204" pitchFamily="34" charset="0"/>
               </a:rPr>
-              <a:t>Shift:</a:t>
-            </a:r>
-          </a:p>
-          <a:p>
-            <a:pPr>
+              <a:t>   Shift:</a:t>
+            </a:r>
+          </a:p>
+          <a:p>
+            <a:pPr marL="0" indent="0">
               <a:lnSpc>
                 <a:spcPct val="60000"/>
               </a:lnSpc>
+              <a:buNone/>
             </a:pPr>
             <a:r>
-              <a:rPr lang="en-US" sz="1200" dirty="0">
+              <a:rPr lang="en-US" sz="1300" dirty="0">
                 <a:latin typeface="Baskerville Old Face" panose="02020602080505020303" pitchFamily="18" charset="0"/>
                 <a:cs typeface="Helvetica" panose="020B0604020202020204" pitchFamily="34" charset="0"/>
               </a:rPr>
-              <a:t>Shifts redefined:</a:t>
+              <a:t>   Shifts redefined:</a:t>
             </a:r>
           </a:p>
           <a:p>
@@ -5771,7 +5798,7 @@
                 <a:spcPct val="60000"/>
               </a:lnSpc>
             </a:pPr>
-            <a:endParaRPr lang="en-US" sz="1200" dirty="0">
+            <a:endParaRPr lang="en-US" sz="1300" dirty="0">
               <a:latin typeface="Baskerville Old Face" panose="02020602080505020303" pitchFamily="18" charset="0"/>
               <a:cs typeface="Helvetica" panose="020B0604020202020204" pitchFamily="34" charset="0"/>
             </a:endParaRPr>
@@ -5797,7 +5824,7 @@
           </p:nvPr>
         </p:nvPicPr>
         <p:blipFill>
-          <a:blip r:embed="rId23" cstate="print">
+          <a:blip r:embed="rId24" cstate="print">
             <a:extLst>
               <a:ext uri="{28A0092B-C50C-407E-A947-70E740481C1C}">
                 <a14:useLocalDpi xmlns:a14="http://schemas.microsoft.com/office/drawing/2010/main" val="0"/>
@@ -5810,7 +5837,7 @@
         </p:blipFill>
         <p:spPr>
           <a:xfrm>
-            <a:off x="4171612" y="5932556"/>
+            <a:off x="4195427" y="5835488"/>
             <a:ext cx="469242" cy="112097"/>
           </a:xfrm>
           <a:prstGeom prst="rect">
@@ -5837,7 +5864,7 @@
           </p:nvPr>
         </p:nvPicPr>
         <p:blipFill>
-          <a:blip r:embed="rId24" cstate="print">
+          <a:blip r:embed="rId25" cstate="print">
             <a:extLst>
               <a:ext uri="{28A0092B-C50C-407E-A947-70E740481C1C}">
                 <a14:useLocalDpi xmlns:a14="http://schemas.microsoft.com/office/drawing/2010/main" val="0"/>
@@ -5850,7 +5877,7 @@
         </p:blipFill>
         <p:spPr>
           <a:xfrm>
-            <a:off x="4436841" y="6146604"/>
+            <a:off x="4451130" y="6068588"/>
             <a:ext cx="501029" cy="151771"/>
           </a:xfrm>
           <a:prstGeom prst="rect">
@@ -5877,7 +5904,7 @@
           </p:nvPr>
         </p:nvPicPr>
         <p:blipFill>
-          <a:blip r:embed="rId25" cstate="print">
+          <a:blip r:embed="rId26" cstate="print">
             <a:extLst>
               <a:ext uri="{28A0092B-C50C-407E-A947-70E740481C1C}">
                 <a14:useLocalDpi xmlns:a14="http://schemas.microsoft.com/office/drawing/2010/main" val="0"/>
@@ -5890,7 +5917,7 @@
         </p:blipFill>
         <p:spPr>
           <a:xfrm>
-            <a:off x="5734391" y="5932123"/>
+            <a:off x="5729628" y="5806477"/>
             <a:ext cx="475429" cy="110628"/>
           </a:xfrm>
           <a:prstGeom prst="rect">
@@ -5917,7 +5944,7 @@
           </p:nvPr>
         </p:nvPicPr>
         <p:blipFill>
-          <a:blip r:embed="rId26" cstate="print">
+          <a:blip r:embed="rId27" cstate="print">
             <a:extLst>
               <a:ext uri="{28A0092B-C50C-407E-A947-70E740481C1C}">
                 <a14:useLocalDpi xmlns:a14="http://schemas.microsoft.com/office/drawing/2010/main" val="0"/>
@@ -5930,7 +5957,7 @@
         </p:blipFill>
         <p:spPr>
           <a:xfrm>
-            <a:off x="4280955" y="6399924"/>
+            <a:off x="4300007" y="6321908"/>
             <a:ext cx="1564342" cy="141714"/>
           </a:xfrm>
           <a:prstGeom prst="rect">
@@ -5954,7 +5981,7 @@
         </p:nvSpPr>
         <p:spPr>
           <a:xfrm>
-            <a:off x="5024144" y="5915932"/>
+            <a:off x="5024144" y="5780760"/>
             <a:ext cx="1512761" cy="564108"/>
           </a:xfrm>
           <a:prstGeom prst="rect">
@@ -6130,31 +6157,33 @@
             </a:lvl9pPr>
           </a:lstStyle>
           <a:p>
-            <a:pPr>
+            <a:pPr marL="0" indent="0">
               <a:lnSpc>
                 <a:spcPct val="60000"/>
               </a:lnSpc>
+              <a:buNone/>
             </a:pPr>
             <a:r>
-              <a:rPr lang="en-US" sz="1200" dirty="0">
+              <a:rPr lang="en-US" sz="1300" dirty="0">
                 <a:latin typeface="Baskerville Old Face" panose="02020602080505020303" pitchFamily="18" charset="0"/>
                 <a:cs typeface="Helvetica" panose="020B0604020202020204" pitchFamily="34" charset="0"/>
               </a:rPr>
-              <a:t>Shift:</a:t>
-            </a:r>
-          </a:p>
-          <a:p>
-            <a:pPr>
+              <a:t>   Shift:</a:t>
+            </a:r>
+          </a:p>
+          <a:p>
+            <a:pPr marL="0" indent="0">
               <a:lnSpc>
                 <a:spcPct val="60000"/>
               </a:lnSpc>
+              <a:buNone/>
             </a:pPr>
             <a:r>
-              <a:rPr lang="en-US" sz="1200" dirty="0">
+              <a:rPr lang="en-US" sz="1300" dirty="0">
                 <a:latin typeface="Baskerville Old Face" panose="02020602080505020303" pitchFamily="18" charset="0"/>
                 <a:cs typeface="Helvetica" panose="020B0604020202020204" pitchFamily="34" charset="0"/>
               </a:rPr>
-              <a:t>Concatenation:  </a:t>
+              <a:t>   Concatenation:  </a:t>
             </a:r>
           </a:p>
         </p:txBody>
@@ -6178,7 +6207,7 @@
           </p:nvPr>
         </p:nvPicPr>
         <p:blipFill>
-          <a:blip r:embed="rId27" cstate="print">
+          <a:blip r:embed="rId28" cstate="print">
             <a:extLst>
               <a:ext uri="{28A0092B-C50C-407E-A947-70E740481C1C}">
                 <a14:useLocalDpi xmlns:a14="http://schemas.microsoft.com/office/drawing/2010/main" val="0"/>
@@ -6191,7 +6220,7 @@
         </p:blipFill>
         <p:spPr>
           <a:xfrm>
-            <a:off x="6265247" y="6194546"/>
+            <a:off x="6289062" y="6064137"/>
             <a:ext cx="59429" cy="59429"/>
           </a:xfrm>
           <a:prstGeom prst="rect">
@@ -6218,7 +6247,7 @@
           </p:nvPr>
         </p:nvPicPr>
         <p:blipFill>
-          <a:blip r:embed="rId28" cstate="print">
+          <a:blip r:embed="rId29" cstate="print">
             <a:extLst>
               <a:ext uri="{28A0092B-C50C-407E-A947-70E740481C1C}">
                 <a14:useLocalDpi xmlns:a14="http://schemas.microsoft.com/office/drawing/2010/main" val="0"/>
@@ -6231,7 +6260,7 @@
         </p:blipFill>
         <p:spPr>
           <a:xfrm>
-            <a:off x="4341915" y="6880062"/>
+            <a:off x="4318101" y="6802045"/>
             <a:ext cx="488228" cy="126171"/>
           </a:xfrm>
           <a:prstGeom prst="rect">
@@ -6258,7 +6287,7 @@
           </p:nvPr>
         </p:nvPicPr>
         <p:blipFill>
-          <a:blip r:embed="rId29" cstate="print">
+          <a:blip r:embed="rId30" cstate="print">
             <a:extLst>
               <a:ext uri="{28A0092B-C50C-407E-A947-70E740481C1C}">
                 <a14:useLocalDpi xmlns:a14="http://schemas.microsoft.com/office/drawing/2010/main" val="0"/>
@@ -6271,7 +6300,7 @@
         </p:blipFill>
         <p:spPr>
           <a:xfrm>
-            <a:off x="3895009" y="7116703"/>
+            <a:off x="3733079" y="7057736"/>
             <a:ext cx="239543" cy="105142"/>
           </a:xfrm>
           <a:prstGeom prst="rect">
@@ -6298,7 +6327,7 @@
           </p:nvPr>
         </p:nvPicPr>
         <p:blipFill>
-          <a:blip r:embed="rId30" cstate="print">
+          <a:blip r:embed="rId31" cstate="print">
             <a:extLst>
               <a:ext uri="{28A0092B-C50C-407E-A947-70E740481C1C}">
                 <a14:useLocalDpi xmlns:a14="http://schemas.microsoft.com/office/drawing/2010/main" val="0"/>
@@ -6311,8 +6340,48 @@
         </p:blipFill>
         <p:spPr>
           <a:xfrm>
-            <a:off x="4592428" y="7344657"/>
+            <a:off x="4492408" y="7295217"/>
             <a:ext cx="881372" cy="127999"/>
+          </a:xfrm>
+          <a:prstGeom prst="rect">
+            <a:avLst/>
+          </a:prstGeom>
+        </p:spPr>
+      </p:pic>
+      <p:pic>
+        <p:nvPicPr>
+          <p:cNvPr id="6" name="Picture 5">
+            <a:extLst>
+              <a:ext uri="{FF2B5EF4-FFF2-40B4-BE49-F238E27FC236}">
+                <a16:creationId xmlns:a16="http://schemas.microsoft.com/office/drawing/2014/main" id="{ABAA9031-F410-461B-A352-A30FC832B9B5}"/>
+              </a:ext>
+            </a:extLst>
+          </p:cNvPr>
+          <p:cNvPicPr>
+            <a:picLocks noChangeAspect="1"/>
+          </p:cNvPicPr>
+          <p:nvPr>
+            <p:custDataLst>
+              <p:tags r:id="rId15"/>
+            </p:custDataLst>
+          </p:nvPr>
+        </p:nvPicPr>
+        <p:blipFill>
+          <a:blip r:embed="rId32" cstate="print">
+            <a:extLst>
+              <a:ext uri="{28A0092B-C50C-407E-A947-70E740481C1C}">
+                <a14:useLocalDpi xmlns:a14="http://schemas.microsoft.com/office/drawing/2010/main" val="0"/>
+              </a:ext>
+            </a:extLst>
+          </a:blip>
+          <a:stretch>
+            <a:fillRect/>
+          </a:stretch>
+        </p:blipFill>
+        <p:spPr>
+          <a:xfrm>
+            <a:off x="132573" y="1191367"/>
+            <a:ext cx="1853115" cy="153227"/>
           </a:xfrm>
           <a:prstGeom prst="rect">
             <a:avLst/>
@@ -6329,263 +6398,17 @@
   <p:clrMapOvr>
     <a:masterClrMapping/>
   </p:clrMapOvr>
-  <p:timing>
-    <p:tnLst>
-      <p:par>
-        <p:cTn id="1" dur="indefinite" restart="never" nodeType="tmRoot">
-          <p:childTnLst>
-            <p:seq concurrent="1" nextAc="seek">
-              <p:cTn id="2" dur="indefinite" nodeType="mainSeq">
-                <p:childTnLst>
-                  <p:par>
-                    <p:cTn id="3" fill="hold">
-                      <p:stCondLst>
-                        <p:cond delay="indefinite"/>
-                      </p:stCondLst>
-                      <p:childTnLst>
-                        <p:par>
-                          <p:cTn id="4" fill="hold">
-                            <p:stCondLst>
-                              <p:cond delay="0"/>
-                            </p:stCondLst>
-                            <p:childTnLst>
-                              <p:par>
-                                <p:cTn id="5" presetID="1" presetClass="entr" presetSubtype="0" fill="hold" nodeType="clickEffect">
-                                  <p:stCondLst>
-                                    <p:cond delay="0"/>
-                                  </p:stCondLst>
-                                  <p:childTnLst>
-                                    <p:set>
-                                      <p:cBhvr>
-                                        <p:cTn id="6" dur="1" fill="hold">
-                                          <p:stCondLst>
-                                            <p:cond delay="0"/>
-                                          </p:stCondLst>
-                                        </p:cTn>
-                                        <p:tgtEl>
-                                          <p:spTgt spid="47"/>
-                                        </p:tgtEl>
-                                        <p:attrNameLst>
-                                          <p:attrName>style.visibility</p:attrName>
-                                        </p:attrNameLst>
-                                      </p:cBhvr>
-                                      <p:to>
-                                        <p:strVal val="visible"/>
-                                      </p:to>
-                                    </p:set>
-                                  </p:childTnLst>
-                                </p:cTn>
-                              </p:par>
-                              <p:par>
-                                <p:cTn id="7" presetID="1" presetClass="entr" presetSubtype="0" fill="hold" nodeType="withEffect">
-                                  <p:stCondLst>
-                                    <p:cond delay="0"/>
-                                  </p:stCondLst>
-                                  <p:childTnLst>
-                                    <p:set>
-                                      <p:cBhvr>
-                                        <p:cTn id="8" dur="1" fill="hold">
-                                          <p:stCondLst>
-                                            <p:cond delay="0"/>
-                                          </p:stCondLst>
-                                        </p:cTn>
-                                        <p:tgtEl>
-                                          <p:spTgt spid="48"/>
-                                        </p:tgtEl>
-                                        <p:attrNameLst>
-                                          <p:attrName>style.visibility</p:attrName>
-                                        </p:attrNameLst>
-                                      </p:cBhvr>
-                                      <p:to>
-                                        <p:strVal val="visible"/>
-                                      </p:to>
-                                    </p:set>
-                                  </p:childTnLst>
-                                </p:cTn>
-                              </p:par>
-                            </p:childTnLst>
-                          </p:cTn>
-                        </p:par>
-                      </p:childTnLst>
-                    </p:cTn>
-                  </p:par>
-                  <p:par>
-                    <p:cTn id="9" fill="hold">
-                      <p:stCondLst>
-                        <p:cond delay="indefinite"/>
-                      </p:stCondLst>
-                      <p:childTnLst>
-                        <p:par>
-                          <p:cTn id="10" fill="hold">
-                            <p:stCondLst>
-                              <p:cond delay="0"/>
-                            </p:stCondLst>
-                            <p:childTnLst>
-                              <p:par>
-                                <p:cTn id="11" presetID="1" presetClass="entr" presetSubtype="0" fill="hold" nodeType="clickEffect">
-                                  <p:stCondLst>
-                                    <p:cond delay="0"/>
-                                  </p:stCondLst>
-                                  <p:childTnLst>
-                                    <p:set>
-                                      <p:cBhvr>
-                                        <p:cTn id="12" dur="1" fill="hold">
-                                          <p:stCondLst>
-                                            <p:cond delay="0"/>
-                                          </p:stCondLst>
-                                        </p:cTn>
-                                        <p:tgtEl>
-                                          <p:spTgt spid="51"/>
-                                        </p:tgtEl>
-                                        <p:attrNameLst>
-                                          <p:attrName>style.visibility</p:attrName>
-                                        </p:attrNameLst>
-                                      </p:cBhvr>
-                                      <p:to>
-                                        <p:strVal val="visible"/>
-                                      </p:to>
-                                    </p:set>
-                                  </p:childTnLst>
-                                </p:cTn>
-                              </p:par>
-                              <p:par>
-                                <p:cTn id="13" presetID="1" presetClass="entr" presetSubtype="0" fill="hold" nodeType="withEffect">
-                                  <p:stCondLst>
-                                    <p:cond delay="0"/>
-                                  </p:stCondLst>
-                                  <p:childTnLst>
-                                    <p:set>
-                                      <p:cBhvr>
-                                        <p:cTn id="14" dur="1" fill="hold">
-                                          <p:stCondLst>
-                                            <p:cond delay="0"/>
-                                          </p:stCondLst>
-                                        </p:cTn>
-                                        <p:tgtEl>
-                                          <p:spTgt spid="52"/>
-                                        </p:tgtEl>
-                                        <p:attrNameLst>
-                                          <p:attrName>style.visibility</p:attrName>
-                                        </p:attrNameLst>
-                                      </p:cBhvr>
-                                      <p:to>
-                                        <p:strVal val="visible"/>
-                                      </p:to>
-                                    </p:set>
-                                  </p:childTnLst>
-                                </p:cTn>
-                              </p:par>
-                              <p:par>
-                                <p:cTn id="15" presetID="1" presetClass="entr" presetSubtype="0" fill="hold" nodeType="withEffect">
-                                  <p:stCondLst>
-                                    <p:cond delay="0"/>
-                                  </p:stCondLst>
-                                  <p:childTnLst>
-                                    <p:set>
-                                      <p:cBhvr>
-                                        <p:cTn id="16" dur="1" fill="hold">
-                                          <p:stCondLst>
-                                            <p:cond delay="0"/>
-                                          </p:stCondLst>
-                                        </p:cTn>
-                                        <p:tgtEl>
-                                          <p:spTgt spid="53"/>
-                                        </p:tgtEl>
-                                        <p:attrNameLst>
-                                          <p:attrName>style.visibility</p:attrName>
-                                        </p:attrNameLst>
-                                      </p:cBhvr>
-                                      <p:to>
-                                        <p:strVal val="visible"/>
-                                      </p:to>
-                                    </p:set>
-                                  </p:childTnLst>
-                                </p:cTn>
-                              </p:par>
-                            </p:childTnLst>
-                          </p:cTn>
-                        </p:par>
-                      </p:childTnLst>
-                    </p:cTn>
-                  </p:par>
-                  <p:par>
-                    <p:cTn id="17" fill="hold">
-                      <p:stCondLst>
-                        <p:cond delay="indefinite"/>
-                      </p:stCondLst>
-                      <p:childTnLst>
-                        <p:par>
-                          <p:cTn id="18" fill="hold">
-                            <p:stCondLst>
-                              <p:cond delay="0"/>
-                            </p:stCondLst>
-                            <p:childTnLst>
-                              <p:par>
-                                <p:cTn id="19" presetID="1" presetClass="entr" presetSubtype="0" fill="hold" nodeType="clickEffect">
-                                  <p:stCondLst>
-                                    <p:cond delay="0"/>
-                                  </p:stCondLst>
-                                  <p:childTnLst>
-                                    <p:set>
-                                      <p:cBhvr>
-                                        <p:cTn id="20" dur="1" fill="hold">
-                                          <p:stCondLst>
-                                            <p:cond delay="0"/>
-                                          </p:stCondLst>
-                                        </p:cTn>
-                                        <p:tgtEl>
-                                          <p:spTgt spid="79"/>
-                                        </p:tgtEl>
-                                        <p:attrNameLst>
-                                          <p:attrName>style.visibility</p:attrName>
-                                        </p:attrNameLst>
-                                      </p:cBhvr>
-                                      <p:to>
-                                        <p:strVal val="visible"/>
-                                      </p:to>
-                                    </p:set>
-                                  </p:childTnLst>
-                                </p:cTn>
-                              </p:par>
-                            </p:childTnLst>
-                          </p:cTn>
-                        </p:par>
-                      </p:childTnLst>
-                    </p:cTn>
-                  </p:par>
-                </p:childTnLst>
-              </p:cTn>
-              <p:prevCondLst>
-                <p:cond evt="onPrev" delay="0">
-                  <p:tgtEl>
-                    <p:sldTgt/>
-                  </p:tgtEl>
-                </p:cond>
-              </p:prevCondLst>
-              <p:nextCondLst>
-                <p:cond evt="onNext" delay="0">
-                  <p:tgtEl>
-                    <p:sldTgt/>
-                  </p:tgtEl>
-                </p:cond>
-              </p:nextCondLst>
-            </p:seq>
-          </p:childTnLst>
-        </p:cTn>
-      </p:par>
-    </p:tnLst>
-  </p:timing>
 </p:sld>
 </file>
 
 <file path=ppt/tags/tag1.xml><?xml version="1.0" encoding="utf-8"?>
 <p:tagLst xmlns:a="http://schemas.openxmlformats.org/drawingml/2006/main" xmlns:r="http://schemas.openxmlformats.org/officeDocument/2006/relationships" xmlns:p="http://schemas.openxmlformats.org/presentationml/2006/main">
   <p:tag name="OUTPUTDPI" val="1200"/>
-  <p:tag name="ORIGINALHEIGHT" val="547.4316"/>
-  <p:tag name="ORIGINALWIDTH" val="2525.684"/>
-  <p:tag name="LATEXADDIN" val="\documentclass{article}&#10;\usepackage{amsmath}&#10;\usepackage{mathtools}&#10;\usepackage[dvipsnames]{xcolor}&#10;\pagestyle{empty}&#10;\begin{document}&#10;\color{NavyBlue}$\overbrace{\forall s,t : BV_n.\ \underbrace{IC[s,t]}_{\substack{\text{Invertibility} \\ \text{Condition}}} \iff \exists x : BV_n.\ \ell[x,s,t]}^{\text{Invertibility Equivalence}}$&#10;\end{document}"/>
+  <p:tag name="ORIGINALHEIGHT" val="376.4529"/>
+  <p:tag name="ORIGINALWIDTH" val="2505.437"/>
+  <p:tag name="LATEXADDIN" val="\documentclass{article}&#10;\usepackage{amsmath}&#10;\usepackage{mathtools}&#10;\usepackage[dvipsnames]{xcolor}&#10;\pagestyle{empty}&#10;\begin{document}&#10;\color{NavyBlue}&#10;$\forall s,t : BV_n.\ \underbrace{IC[s,t]}_{\substack{\text{Invertibility} \\ \text{Condition}}} \iff \exists x : BV_n.\ \ell[x,s,t]$&#10;\end{document}"/>
   <p:tag name="IGUANATEXSIZE" val="28"/>
-  <p:tag name="IGUANATEXCURSOR" val="280"/>
+  <p:tag name="IGUANATEXCURSOR" val="284"/>
   <p:tag name="TRANSPARENCY" val="True"/>
   <p:tag name="FILENAME" val=""/>
   <p:tag name="LATEXENGINEID" val="0"/>
@@ -6681,6 +6504,25 @@
   <p:tag name="LATEXADDIN" val="\documentclass{article}&#10;\usepackage{amsmath}&#10;\usepackage[dvipsnames]{xcolor}&#10;\pagestyle{empty}&#10;\begin{document}&#10;\color{NavyBlue}$\underline{&lt;\kern-.3em&lt;},\ \underline{&gt;\kern-.3em&gt;},\ \underline{&gt;\kern-.3em&gt;_a}$&#10;\end{document}"/>
   <p:tag name="IGUANATEXSIZE" val="12"/>
   <p:tag name="IGUANATEXCURSOR" val="181"/>
+  <p:tag name="TRANSPARENCY" val="True"/>
+  <p:tag name="FILENAME" val=""/>
+  <p:tag name="LATEXENGINEID" val="0"/>
+  <p:tag name="TEMPFOLDER" val="c:\temp\"/>
+  <p:tag name="LATEXFORMHEIGHT" val="312"/>
+  <p:tag name="LATEXFORMWIDTH" val="384"/>
+  <p:tag name="LATEXFORMWRAP" val="True"/>
+  <p:tag name="BITMAPVECTOR" val="0"/>
+</p:tagLst>
+</file>
+
+<file path=ppt/tags/tag15.xml><?xml version="1.0" encoding="utf-8"?>
+<p:tagLst xmlns:a="http://schemas.openxmlformats.org/drawingml/2006/main" xmlns:r="http://schemas.openxmlformats.org/officeDocument/2006/relationships" xmlns:p="http://schemas.openxmlformats.org/presentationml/2006/main">
+  <p:tag name="OUTPUTDPI" val="1200"/>
+  <p:tag name="ORIGINALHEIGHT" val="111.7361"/>
+  <p:tag name="ORIGINALWIDTH" val="1351.331"/>
+  <p:tag name="LATEXADDIN" val="\documentclass{article}&#10;\usepackage{amsmath}&#10;\usepackage[dvipsnames]{xcolor}&#10;\pagestyle{empty}&#10;\begin{document}&#10;\color{NavyBlue}Invertibility Equivalence:&#10;\end{document}"/>
+  <p:tag name="IGUANATEXSIZE" val="20"/>
+  <p:tag name="IGUANATEXCURSOR" val="128"/>
   <p:tag name="TRANSPARENCY" val="True"/>
   <p:tag name="FILENAME" val=""/>
   <p:tag name="LATEXENGINEID" val="0"/>

</xml_diff>

<commit_message>
Final version of poster with PDF to scale
</commit_message>
<xml_diff>
--- a/FMCAD Poster.pptx
+++ b/FMCAD Poster.pptx
@@ -1,6 +1,6 @@
 
 <file path=ppt/presentation.xml><?xml version="1.0" encoding="utf-8"?>
-<p:presentation xmlns:a="http://schemas.openxmlformats.org/drawingml/2006/main" xmlns:r="http://schemas.openxmlformats.org/officeDocument/2006/relationships" xmlns:p="http://schemas.openxmlformats.org/presentationml/2006/main" saveSubsetFonts="1">
+<p:presentation xmlns:a="http://schemas.openxmlformats.org/drawingml/2006/main" xmlns:r="http://schemas.openxmlformats.org/officeDocument/2006/relationships" xmlns:p="http://schemas.openxmlformats.org/presentationml/2006/main" saveSubsetFonts="1" autoCompressPictures="0">
   <p:sldMasterIdLst>
     <p:sldMasterId id="2147483672" r:id="rId1"/>
   </p:sldMasterIdLst>
@@ -8,7 +8,7 @@
     <p:sldId id="257" r:id="rId2"/>
   </p:sldIdLst>
   <p:sldSz cx="6858000" cy="9906000" type="A4"/>
-  <p:notesSz cx="7010400" cy="9296400"/>
+  <p:notesSz cx="7315200" cy="9601200"/>
   <p:defaultTextStyle>
     <a:defPPr>
       <a:defRPr lang="en-US"/>
@@ -115,9 +115,9 @@
 <file path=ppt/revisionInfo.xml><?xml version="1.0" encoding="utf-8"?>
 <p1510:revInfo xmlns:a="http://schemas.openxmlformats.org/drawingml/2006/main" xmlns:r="http://schemas.openxmlformats.org/officeDocument/2006/relationships" xmlns:p1510="http://schemas.microsoft.com/office/powerpoint/2015/10/main">
   <p1510:revLst>
+    <p1510:client id="{4FB6AA68-809D-F51E-F4CE-AD11CF5F0493}" v="609" dt="2019-09-28T00:46:43.085"/>
+    <p1510:client id="{869EC253-3183-9D03-DEF4-48C017D3C47D}" v="51" dt="2019-09-27T23:52:25.014"/>
     <p1510:client id="{FD8E1D27-11F9-1F91-3558-DE17A3379917}" v="55" dt="2019-09-28T02:48:01.550"/>
-    <p1510:client id="{869EC253-3183-9D03-DEF4-48C017D3C47D}" v="51" dt="2019-09-27T23:52:25.014"/>
-    <p1510:client id="{4FB6AA68-809D-F51E-F4CE-AD11CF5F0493}" v="609" dt="2019-09-28T00:46:43.085"/>
     <p1510:client id="{B0A645ED-900C-C548-20FF-3E18CB47768F}" v="91" dt="2019-09-28T01:00:44.013"/>
   </p1510:revLst>
 </p1510:revInfo>
@@ -546,7 +546,7 @@
           <a:p>
             <a:fld id="{846CE7D5-CF57-46EF-B807-FDD0502418D4}" type="datetimeFigureOut">
               <a:rPr lang="en-US" smtClean="0"/>
-              <a:t>10/8/2019</a:t>
+              <a:t>10/15/2019</a:t>
             </a:fld>
             <a:endParaRPr lang="en-US"/>
           </a:p>
@@ -716,7 +716,7 @@
           <a:p>
             <a:fld id="{846CE7D5-CF57-46EF-B807-FDD0502418D4}" type="datetimeFigureOut">
               <a:rPr lang="en-US" smtClean="0"/>
-              <a:t>10/8/2019</a:t>
+              <a:t>10/15/2019</a:t>
             </a:fld>
             <a:endParaRPr lang="en-US"/>
           </a:p>
@@ -896,7 +896,7 @@
           <a:p>
             <a:fld id="{846CE7D5-CF57-46EF-B807-FDD0502418D4}" type="datetimeFigureOut">
               <a:rPr lang="en-US" smtClean="0"/>
-              <a:t>10/8/2019</a:t>
+              <a:t>10/15/2019</a:t>
             </a:fld>
             <a:endParaRPr lang="en-US"/>
           </a:p>
@@ -1066,7 +1066,7 @@
           <a:p>
             <a:fld id="{846CE7D5-CF57-46EF-B807-FDD0502418D4}" type="datetimeFigureOut">
               <a:rPr lang="en-US" smtClean="0"/>
-              <a:t>10/8/2019</a:t>
+              <a:t>10/15/2019</a:t>
             </a:fld>
             <a:endParaRPr lang="en-US"/>
           </a:p>
@@ -1310,7 +1310,7 @@
           <a:p>
             <a:fld id="{846CE7D5-CF57-46EF-B807-FDD0502418D4}" type="datetimeFigureOut">
               <a:rPr lang="en-US" smtClean="0"/>
-              <a:t>10/8/2019</a:t>
+              <a:t>10/15/2019</a:t>
             </a:fld>
             <a:endParaRPr lang="en-US"/>
           </a:p>
@@ -1542,7 +1542,7 @@
           <a:p>
             <a:fld id="{846CE7D5-CF57-46EF-B807-FDD0502418D4}" type="datetimeFigureOut">
               <a:rPr lang="en-US" smtClean="0"/>
-              <a:t>10/8/2019</a:t>
+              <a:t>10/15/2019</a:t>
             </a:fld>
             <a:endParaRPr lang="en-US"/>
           </a:p>
@@ -1909,7 +1909,7 @@
           <a:p>
             <a:fld id="{846CE7D5-CF57-46EF-B807-FDD0502418D4}" type="datetimeFigureOut">
               <a:rPr lang="en-US" smtClean="0"/>
-              <a:t>10/8/2019</a:t>
+              <a:t>10/15/2019</a:t>
             </a:fld>
             <a:endParaRPr lang="en-US"/>
           </a:p>
@@ -2027,7 +2027,7 @@
           <a:p>
             <a:fld id="{846CE7D5-CF57-46EF-B807-FDD0502418D4}" type="datetimeFigureOut">
               <a:rPr lang="en-US" smtClean="0"/>
-              <a:t>10/8/2019</a:t>
+              <a:t>10/15/2019</a:t>
             </a:fld>
             <a:endParaRPr lang="en-US"/>
           </a:p>
@@ -2122,7 +2122,7 @@
           <a:p>
             <a:fld id="{846CE7D5-CF57-46EF-B807-FDD0502418D4}" type="datetimeFigureOut">
               <a:rPr lang="en-US" smtClean="0"/>
-              <a:t>10/8/2019</a:t>
+              <a:t>10/15/2019</a:t>
             </a:fld>
             <a:endParaRPr lang="en-US"/>
           </a:p>
@@ -2399,7 +2399,7 @@
           <a:p>
             <a:fld id="{846CE7D5-CF57-46EF-B807-FDD0502418D4}" type="datetimeFigureOut">
               <a:rPr lang="en-US" smtClean="0"/>
-              <a:t>10/8/2019</a:t>
+              <a:t>10/15/2019</a:t>
             </a:fld>
             <a:endParaRPr lang="en-US"/>
           </a:p>
@@ -2656,7 +2656,7 @@
           <a:p>
             <a:fld id="{846CE7D5-CF57-46EF-B807-FDD0502418D4}" type="datetimeFigureOut">
               <a:rPr lang="en-US" smtClean="0"/>
-              <a:t>10/8/2019</a:t>
+              <a:t>10/15/2019</a:t>
             </a:fld>
             <a:endParaRPr lang="en-US"/>
           </a:p>
@@ -2869,7 +2869,7 @@
           <a:p>
             <a:fld id="{846CE7D5-CF57-46EF-B807-FDD0502418D4}" type="datetimeFigureOut">
               <a:rPr lang="en-US" smtClean="0"/>
-              <a:t>10/8/2019</a:t>
+              <a:t>10/15/2019</a:t>
             </a:fld>
             <a:endParaRPr lang="en-US"/>
           </a:p>
@@ -3289,7 +3289,7 @@
           <p:nvPr>
             <p:extLst>
               <p:ext uri="{D42A27DB-BD31-4B8C-83A1-F6EECF244321}">
-                <p14:modId xmlns:p14="http://schemas.microsoft.com/office/powerpoint/2010/main" val="941608351"/>
+                <p14:modId xmlns:p14="http://schemas.microsoft.com/office/powerpoint/2010/main" val="169138698"/>
               </p:ext>
             </p:extLst>
           </p:nvPr>
@@ -3376,7 +3376,7 @@
                           <a:effectLst/>
                           <a:latin typeface="Garamond" panose="02020404030301010803" pitchFamily="18" charset="0"/>
                         </a:rPr>
-                        <a:t>[CAV 2018]​</a:t>
+                        <a:t>[CAV 18]​</a:t>
                       </a:r>
                       <a:endParaRPr lang="en-US" sz="1200" b="1" dirty="0">
                         <a:solidFill>
@@ -3783,17 +3783,7 @@
                           <a:effectLst/>
                           <a:latin typeface="Baskerville Old Face" panose="02020602080505020303" pitchFamily="18" charset="0"/>
                         </a:rPr>
-                        <a:t>All equivalences for n = 1 to 65​</a:t>
-                      </a:r>
-                    </a:p>
-                    <a:p>
-                      <a:pPr fontAlgn="base"/>
-                      <a:r>
-                        <a:rPr lang="en-US" sz="1100" dirty="0">
-                          <a:effectLst/>
-                          <a:latin typeface="Baskerville Old Face" panose="02020602080505020303" pitchFamily="18" charset="0"/>
-                        </a:rPr>
-                        <a:t>​</a:t>
+                        <a:t>Verified all equivalences for n = 1 to 65​</a:t>
                       </a:r>
                     </a:p>
                   </a:txBody>
@@ -3840,7 +3830,7 @@
                           <a:effectLst/>
                           <a:latin typeface="Baskerville Old Face" panose="02020602080505020303" pitchFamily="18" charset="0"/>
                         </a:rPr>
-                        <a:t>18 equivalences​</a:t>
+                        <a:t>Verified 18 equivalences​</a:t>
                       </a:r>
                     </a:p>
                     <a:p>
@@ -4741,10 +4731,10 @@
       </p:sp>
       <p:pic>
         <p:nvPicPr>
-          <p:cNvPr id="8" name="Picture 7">
+          <p:cNvPr id="4" name="Picture 3">
             <a:extLst>
               <a:ext uri="{FF2B5EF4-FFF2-40B4-BE49-F238E27FC236}">
-                <a16:creationId xmlns:a16="http://schemas.microsoft.com/office/drawing/2014/main" id="{C431FB15-9104-4DF2-9C48-573A37F19B5E}"/>
+                <a16:creationId xmlns:a16="http://schemas.microsoft.com/office/drawing/2014/main" id="{C1D16F0D-3F81-48F8-9F81-66ED008EAAB6}"/>
               </a:ext>
             </a:extLst>
           </p:cNvPr>
@@ -4772,7 +4762,7 @@
         <p:spPr>
           <a:xfrm>
             <a:off x="132573" y="1400664"/>
-            <a:ext cx="3203050" cy="481271"/>
+            <a:ext cx="3149362" cy="481271"/>
           </a:xfrm>
           <a:prstGeom prst="rect">
             <a:avLst/>
@@ -4967,42 +4957,6 @@
           </a:p>
         </p:txBody>
       </p:sp>
-      <p:pic>
-        <p:nvPicPr>
-          <p:cNvPr id="38" name="Picture 37">
-            <a:extLst>
-              <a:ext uri="{FF2B5EF4-FFF2-40B4-BE49-F238E27FC236}">
-                <a16:creationId xmlns:a16="http://schemas.microsoft.com/office/drawing/2014/main" id="{1EA017B2-DE39-4591-8E3A-AE2C3C9A1419}"/>
-              </a:ext>
-            </a:extLst>
-          </p:cNvPr>
-          <p:cNvPicPr>
-            <a:picLocks noChangeAspect="1"/>
-          </p:cNvPicPr>
-          <p:nvPr/>
-        </p:nvPicPr>
-        <p:blipFill>
-          <a:blip r:embed="rId18" cstate="print">
-            <a:extLst>
-              <a:ext uri="{28A0092B-C50C-407E-A947-70E740481C1C}">
-                <a14:useLocalDpi xmlns:a14="http://schemas.microsoft.com/office/drawing/2010/main" val="0"/>
-              </a:ext>
-            </a:extLst>
-          </a:blip>
-          <a:stretch>
-            <a:fillRect/>
-          </a:stretch>
-        </p:blipFill>
-        <p:spPr>
-          <a:xfrm>
-            <a:off x="164592" y="207956"/>
-            <a:ext cx="634317" cy="582345"/>
-          </a:xfrm>
-          <a:prstGeom prst="rect">
-            <a:avLst/>
-          </a:prstGeom>
-        </p:spPr>
-      </p:pic>
       <p:sp>
         <p:nvSpPr>
           <p:cNvPr id="42" name="Content Placeholder 2 2 2">
@@ -5275,7 +5229,7 @@
           </p:nvPr>
         </p:nvPicPr>
         <p:blipFill>
-          <a:blip r:embed="rId19" cstate="print">
+          <a:blip r:embed="rId18" cstate="print">
             <a:extLst>
               <a:ext uri="{28A0092B-C50C-407E-A947-70E740481C1C}">
                 <a14:useLocalDpi xmlns:a14="http://schemas.microsoft.com/office/drawing/2010/main" val="0"/>
@@ -5315,7 +5269,7 @@
           </p:nvPr>
         </p:nvPicPr>
         <p:blipFill>
-          <a:blip r:embed="rId20" cstate="print">
+          <a:blip r:embed="rId19" cstate="print">
             <a:extLst>
               <a:ext uri="{28A0092B-C50C-407E-A947-70E740481C1C}">
                 <a14:useLocalDpi xmlns:a14="http://schemas.microsoft.com/office/drawing/2010/main" val="0"/>
@@ -5355,7 +5309,7 @@
           </p:nvPr>
         </p:nvPicPr>
         <p:blipFill>
-          <a:blip r:embed="rId21" cstate="print">
+          <a:blip r:embed="rId20" cstate="print">
             <a:extLst>
               <a:ext uri="{28A0092B-C50C-407E-A947-70E740481C1C}">
                 <a14:useLocalDpi xmlns:a14="http://schemas.microsoft.com/office/drawing/2010/main" val="0"/>
@@ -5395,7 +5349,7 @@
           </p:nvPr>
         </p:nvPicPr>
         <p:blipFill>
-          <a:blip r:embed="rId22" cstate="print">
+          <a:blip r:embed="rId21" cstate="print">
             <a:extLst>
               <a:ext uri="{28A0092B-C50C-407E-A947-70E740481C1C}">
                 <a14:useLocalDpi xmlns:a14="http://schemas.microsoft.com/office/drawing/2010/main" val="0"/>
@@ -5435,7 +5389,7 @@
           </p:nvPr>
         </p:nvPicPr>
         <p:blipFill>
-          <a:blip r:embed="rId23" cstate="print">
+          <a:blip r:embed="rId22" cstate="print">
             <a:extLst>
               <a:ext uri="{28A0092B-C50C-407E-A947-70E740481C1C}">
                 <a14:useLocalDpi xmlns:a14="http://schemas.microsoft.com/office/drawing/2010/main" val="0"/>
@@ -5824,7 +5778,7 @@
           </p:nvPr>
         </p:nvPicPr>
         <p:blipFill>
-          <a:blip r:embed="rId24" cstate="print">
+          <a:blip r:embed="rId23" cstate="print">
             <a:extLst>
               <a:ext uri="{28A0092B-C50C-407E-A947-70E740481C1C}">
                 <a14:useLocalDpi xmlns:a14="http://schemas.microsoft.com/office/drawing/2010/main" val="0"/>
@@ -5864,7 +5818,7 @@
           </p:nvPr>
         </p:nvPicPr>
         <p:blipFill>
-          <a:blip r:embed="rId25" cstate="print">
+          <a:blip r:embed="rId24" cstate="print">
             <a:extLst>
               <a:ext uri="{28A0092B-C50C-407E-A947-70E740481C1C}">
                 <a14:useLocalDpi xmlns:a14="http://schemas.microsoft.com/office/drawing/2010/main" val="0"/>
@@ -5904,7 +5858,7 @@
           </p:nvPr>
         </p:nvPicPr>
         <p:blipFill>
-          <a:blip r:embed="rId26" cstate="print">
+          <a:blip r:embed="rId25" cstate="print">
             <a:extLst>
               <a:ext uri="{28A0092B-C50C-407E-A947-70E740481C1C}">
                 <a14:useLocalDpi xmlns:a14="http://schemas.microsoft.com/office/drawing/2010/main" val="0"/>
@@ -5944,7 +5898,7 @@
           </p:nvPr>
         </p:nvPicPr>
         <p:blipFill>
-          <a:blip r:embed="rId27" cstate="print">
+          <a:blip r:embed="rId26" cstate="print">
             <a:extLst>
               <a:ext uri="{28A0092B-C50C-407E-A947-70E740481C1C}">
                 <a14:useLocalDpi xmlns:a14="http://schemas.microsoft.com/office/drawing/2010/main" val="0"/>
@@ -6207,7 +6161,7 @@
           </p:nvPr>
         </p:nvPicPr>
         <p:blipFill>
-          <a:blip r:embed="rId28" cstate="print">
+          <a:blip r:embed="rId27" cstate="print">
             <a:extLst>
               <a:ext uri="{28A0092B-C50C-407E-A947-70E740481C1C}">
                 <a14:useLocalDpi xmlns:a14="http://schemas.microsoft.com/office/drawing/2010/main" val="0"/>
@@ -6247,7 +6201,7 @@
           </p:nvPr>
         </p:nvPicPr>
         <p:blipFill>
-          <a:blip r:embed="rId29" cstate="print">
+          <a:blip r:embed="rId28" cstate="print">
             <a:extLst>
               <a:ext uri="{28A0092B-C50C-407E-A947-70E740481C1C}">
                 <a14:useLocalDpi xmlns:a14="http://schemas.microsoft.com/office/drawing/2010/main" val="0"/>
@@ -6260,7 +6214,7 @@
         </p:blipFill>
         <p:spPr>
           <a:xfrm>
-            <a:off x="4318101" y="6802045"/>
+            <a:off x="4310637" y="6809509"/>
             <a:ext cx="488228" cy="126171"/>
           </a:xfrm>
           <a:prstGeom prst="rect">
@@ -6287,7 +6241,7 @@
           </p:nvPr>
         </p:nvPicPr>
         <p:blipFill>
-          <a:blip r:embed="rId30" cstate="print">
+          <a:blip r:embed="rId29" cstate="print">
             <a:extLst>
               <a:ext uri="{28A0092B-C50C-407E-A947-70E740481C1C}">
                 <a14:useLocalDpi xmlns:a14="http://schemas.microsoft.com/office/drawing/2010/main" val="0"/>
@@ -6327,7 +6281,7 @@
           </p:nvPr>
         </p:nvPicPr>
         <p:blipFill>
-          <a:blip r:embed="rId31" cstate="print">
+          <a:blip r:embed="rId30" cstate="print">
             <a:extLst>
               <a:ext uri="{28A0092B-C50C-407E-A947-70E740481C1C}">
                 <a14:useLocalDpi xmlns:a14="http://schemas.microsoft.com/office/drawing/2010/main" val="0"/>
@@ -6367,7 +6321,7 @@
           </p:nvPr>
         </p:nvPicPr>
         <p:blipFill>
-          <a:blip r:embed="rId32" cstate="print">
+          <a:blip r:embed="rId31" cstate="print">
             <a:extLst>
               <a:ext uri="{28A0092B-C50C-407E-A947-70E740481C1C}">
                 <a14:useLocalDpi xmlns:a14="http://schemas.microsoft.com/office/drawing/2010/main" val="0"/>
@@ -6382,6 +6336,36 @@
           <a:xfrm>
             <a:off x="132573" y="1191367"/>
             <a:ext cx="1853115" cy="153227"/>
+          </a:xfrm>
+          <a:prstGeom prst="rect">
+            <a:avLst/>
+          </a:prstGeom>
+        </p:spPr>
+      </p:pic>
+      <p:pic>
+        <p:nvPicPr>
+          <p:cNvPr id="7" name="Picture 6">
+            <a:extLst>
+              <a:ext uri="{FF2B5EF4-FFF2-40B4-BE49-F238E27FC236}">
+                <a16:creationId xmlns:a16="http://schemas.microsoft.com/office/drawing/2014/main" id="{1CFFDAA3-A490-4316-9EE8-B78E1F58F673}"/>
+              </a:ext>
+            </a:extLst>
+          </p:cNvPr>
+          <p:cNvPicPr>
+            <a:picLocks noChangeAspect="1"/>
+          </p:cNvPicPr>
+          <p:nvPr/>
+        </p:nvPicPr>
+        <p:blipFill>
+          <a:blip r:embed="rId32"/>
+          <a:stretch>
+            <a:fillRect/>
+          </a:stretch>
+        </p:blipFill>
+        <p:spPr>
+          <a:xfrm>
+            <a:off x="141899" y="206592"/>
+            <a:ext cx="656801" cy="602987"/>
           </a:xfrm>
           <a:prstGeom prst="rect">
             <a:avLst/>
@@ -6405,10 +6389,10 @@
 <p:tagLst xmlns:a="http://schemas.openxmlformats.org/drawingml/2006/main" xmlns:r="http://schemas.openxmlformats.org/officeDocument/2006/relationships" xmlns:p="http://schemas.openxmlformats.org/presentationml/2006/main">
   <p:tag name="OUTPUTDPI" val="1200"/>
   <p:tag name="ORIGINALHEIGHT" val="376.4529"/>
-  <p:tag name="ORIGINALWIDTH" val="2505.437"/>
-  <p:tag name="LATEXADDIN" val="\documentclass{article}&#10;\usepackage{amsmath}&#10;\usepackage{mathtools}&#10;\usepackage[dvipsnames]{xcolor}&#10;\pagestyle{empty}&#10;\begin{document}&#10;\color{NavyBlue}&#10;$\forall s,t : BV_n.\ \underbrace{IC[s,t]}_{\substack{\text{Invertibility} \\ \text{Condition}}} \iff \exists x : BV_n.\ \ell[x,s,t]$&#10;\end{document}"/>
+  <p:tag name="ORIGINALWIDTH" val="2463.442"/>
+  <p:tag name="LATEXADDIN" val="\documentclass{article}&#10;\usepackage{amsmath}&#10;\usepackage{mathtools}&#10;\usepackage[dvipsnames]{xcolor}&#10;\pagestyle{empty}&#10;\begin{document}&#10;\color{NavyBlue}&#10;$\forall s,t : BV_n.\underbrace{IC[s,t]}_{\substack{\text{Invertibility} \\ \text{Condition}}} \iff \exists x : BV_n.\ \ell[x,s,t]$&#10;\end{document}"/>
   <p:tag name="IGUANATEXSIZE" val="28"/>
-  <p:tag name="IGUANATEXCURSOR" val="284"/>
+  <p:tag name="IGUANATEXCURSOR" val="172"/>
   <p:tag name="TRANSPARENCY" val="True"/>
   <p:tag name="FILENAME" val=""/>
   <p:tag name="LATEXENGINEID" val="0"/>

</xml_diff>